<commit_message>
add cli basics examples + upate slides
</commit_message>
<xml_diff>
--- a/slides/client/CLI Basics.pptx
+++ b/slides/client/CLI Basics.pptx
@@ -16,6 +16,7 @@
     <p:sldId id="261" r:id="rId13"/>
     <p:sldId id="262" r:id="rId14"/>
     <p:sldId id="263" r:id="rId15"/>
+    <p:sldId id="264" r:id="rId16"/>
   </p:sldIdLst>
   <p:sldSz cx="24384000" cy="13716000"/>
   <p:notesSz cx="6858000" cy="9144000"/>
@@ -5556,7 +5557,7 @@
         <p:spPr>
           <a:xfrm>
             <a:off x="1933187" y="6059699"/>
-            <a:ext cx="12878595" cy="1247776"/>
+            <a:ext cx="12878594" cy="1247776"/>
           </a:xfrm>
           <a:prstGeom prst="rect">
             <a:avLst/>
@@ -5613,7 +5614,7 @@
         <p:spPr>
           <a:xfrm>
             <a:off x="1267506" y="6140080"/>
-            <a:ext cx="604263" cy="1087014"/>
+            <a:ext cx="604263" cy="1087013"/>
           </a:xfrm>
           <a:prstGeom prst="rect">
             <a:avLst/>
@@ -5667,7 +5668,7 @@
         </p:blipFill>
         <p:spPr>
           <a:xfrm rot="5400000">
-            <a:off x="4465514" y="7734668"/>
+            <a:off x="4465515" y="7734668"/>
             <a:ext cx="1115361" cy="405591"/>
           </a:xfrm>
           <a:prstGeom prst="rect">
@@ -5684,7 +5685,7 @@
         <p:spPr>
           <a:xfrm>
             <a:off x="2048569" y="6190880"/>
-            <a:ext cx="5949252" cy="985414"/>
+            <a:ext cx="5949252" cy="985413"/>
           </a:xfrm>
           <a:prstGeom prst="rect">
             <a:avLst/>
@@ -5729,7 +5730,7 @@
         <p:spPr>
           <a:xfrm>
             <a:off x="8225421" y="6190880"/>
-            <a:ext cx="3174599" cy="985414"/>
+            <a:ext cx="3174600" cy="985413"/>
           </a:xfrm>
           <a:prstGeom prst="rect">
             <a:avLst/>
@@ -5774,7 +5775,7 @@
         <p:spPr>
           <a:xfrm>
             <a:off x="11627620" y="6190880"/>
-            <a:ext cx="3174600" cy="985414"/>
+            <a:ext cx="3174600" cy="985413"/>
           </a:xfrm>
           <a:prstGeom prst="rect">
             <a:avLst/>
@@ -5876,7 +5877,7 @@
         </p:blipFill>
         <p:spPr>
           <a:xfrm rot="5400000">
-            <a:off x="9255039" y="7734668"/>
+            <a:off x="9255040" y="7734668"/>
             <a:ext cx="1115361" cy="405591"/>
           </a:xfrm>
           <a:prstGeom prst="rect">
@@ -6183,7 +6184,7 @@
                                       <p:cBhvr>
                                         <p:cTn id="15" fill="hold"/>
                                         <p:tgtEl>
-                                          <p:spTgt spid="188"/>
+                                          <p:spTgt spid="190"/>
                                         </p:tgtEl>
                                         <p:attrNameLst>
                                           <p:attrName>style.visibility</p:attrName>
@@ -6195,9 +6196,9 @@
                                     </p:set>
                                     <p:animEffect filter="dissolve" transition="in">
                                       <p:cBhvr>
-                                        <p:cTn id="16" dur="300"/>
+                                        <p:cTn id="16" dur="800"/>
                                         <p:tgtEl>
-                                          <p:spTgt spid="188"/>
+                                          <p:spTgt spid="190"/>
                                         </p:tgtEl>
                                       </p:cBhvr>
                                     </p:animEffect>
@@ -6210,7 +6211,7 @@
                         <p:par>
                           <p:cTn id="17" fill="hold">
                             <p:stCondLst>
-                              <p:cond delay="1700"/>
+                              <p:cond delay="2200"/>
                             </p:stCondLst>
                             <p:childTnLst>
                               <p:par>
@@ -6226,7 +6227,7 @@
                                       <p:cBhvr>
                                         <p:cTn id="19" fill="hold"/>
                                         <p:tgtEl>
-                                          <p:spTgt spid="194"/>
+                                          <p:spTgt spid="188"/>
                                         </p:tgtEl>
                                         <p:attrNameLst>
                                           <p:attrName>style.visibility</p:attrName>
@@ -6240,7 +6241,7 @@
                                       <p:cBhvr>
                                         <p:cTn id="20" dur="300"/>
                                         <p:tgtEl>
-                                          <p:spTgt spid="194"/>
+                                          <p:spTgt spid="188"/>
                                         </p:tgtEl>
                                       </p:cBhvr>
                                     </p:animEffect>
@@ -6253,11 +6254,54 @@
                         <p:par>
                           <p:cTn id="21" fill="hold">
                             <p:stCondLst>
-                              <p:cond delay="2000"/>
+                              <p:cond delay="2500"/>
                             </p:stCondLst>
                             <p:childTnLst>
                               <p:par>
-                                <p:cTn id="22" presetClass="entr" nodeType="afterEffect" presetID="9" grpId="5" fill="hold">
+                                <p:cTn id="22" presetClass="entr" nodeType="afterEffect" presetID="10" grpId="5" fill="hold">
+                                  <p:stCondLst>
+                                    <p:cond delay="100"/>
+                                  </p:stCondLst>
+                                  <p:iterate type="lt" backwards="0">
+                                    <p:tmAbs val="0"/>
+                                  </p:iterate>
+                                  <p:childTnLst>
+                                    <p:set>
+                                      <p:cBhvr>
+                                        <p:cTn id="23" fill="hold"/>
+                                        <p:tgtEl>
+                                          <p:spTgt spid="193"/>
+                                        </p:tgtEl>
+                                        <p:attrNameLst>
+                                          <p:attrName>style.visibility</p:attrName>
+                                        </p:attrNameLst>
+                                      </p:cBhvr>
+                                      <p:to>
+                                        <p:strVal val="visible"/>
+                                      </p:to>
+                                    </p:set>
+                                    <p:animEffect filter="fade" transition="in">
+                                      <p:cBhvr>
+                                        <p:cTn id="24" dur="800"/>
+                                        <p:tgtEl>
+                                          <p:spTgt spid="193"/>
+                                        </p:tgtEl>
+                                      </p:cBhvr>
+                                    </p:animEffect>
+                                  </p:childTnLst>
+                                </p:cTn>
+                              </p:par>
+                            </p:childTnLst>
+                          </p:cTn>
+                        </p:par>
+                        <p:par>
+                          <p:cTn id="25" fill="hold">
+                            <p:stCondLst>
+                              <p:cond delay="3400"/>
+                            </p:stCondLst>
+                            <p:childTnLst>
+                              <p:par>
+                                <p:cTn id="26" presetClass="entr" nodeType="afterEffect" presetID="9" grpId="6" fill="hold">
                                   <p:stCondLst>
                                     <p:cond delay="0"/>
                                   </p:stCondLst>
@@ -6267,7 +6311,179 @@
                                   <p:childTnLst>
                                     <p:set>
                                       <p:cBhvr>
-                                        <p:cTn id="23" fill="hold"/>
+                                        <p:cTn id="27" fill="hold"/>
+                                        <p:tgtEl>
+                                          <p:spTgt spid="191"/>
+                                        </p:tgtEl>
+                                        <p:attrNameLst>
+                                          <p:attrName>style.visibility</p:attrName>
+                                        </p:attrNameLst>
+                                      </p:cBhvr>
+                                      <p:to>
+                                        <p:strVal val="visible"/>
+                                      </p:to>
+                                    </p:set>
+                                    <p:animEffect filter="dissolve" transition="in">
+                                      <p:cBhvr>
+                                        <p:cTn id="28" dur="800"/>
+                                        <p:tgtEl>
+                                          <p:spTgt spid="191"/>
+                                        </p:tgtEl>
+                                      </p:cBhvr>
+                                    </p:animEffect>
+                                  </p:childTnLst>
+                                </p:cTn>
+                              </p:par>
+                            </p:childTnLst>
+                          </p:cTn>
+                        </p:par>
+                        <p:par>
+                          <p:cTn id="29" fill="hold">
+                            <p:stCondLst>
+                              <p:cond delay="4200"/>
+                            </p:stCondLst>
+                            <p:childTnLst>
+                              <p:par>
+                                <p:cTn id="30" presetClass="entr" nodeType="afterEffect" presetID="9" grpId="7" fill="hold">
+                                  <p:stCondLst>
+                                    <p:cond delay="0"/>
+                                  </p:stCondLst>
+                                  <p:iterate type="el" backwards="0">
+                                    <p:tmAbs val="0"/>
+                                  </p:iterate>
+                                  <p:childTnLst>
+                                    <p:set>
+                                      <p:cBhvr>
+                                        <p:cTn id="31" fill="hold"/>
+                                        <p:tgtEl>
+                                          <p:spTgt spid="194"/>
+                                        </p:tgtEl>
+                                        <p:attrNameLst>
+                                          <p:attrName>style.visibility</p:attrName>
+                                        </p:attrNameLst>
+                                      </p:cBhvr>
+                                      <p:to>
+                                        <p:strVal val="visible"/>
+                                      </p:to>
+                                    </p:set>
+                                    <p:animEffect filter="dissolve" transition="in">
+                                      <p:cBhvr>
+                                        <p:cTn id="32" dur="300"/>
+                                        <p:tgtEl>
+                                          <p:spTgt spid="194"/>
+                                        </p:tgtEl>
+                                      </p:cBhvr>
+                                    </p:animEffect>
+                                  </p:childTnLst>
+                                </p:cTn>
+                              </p:par>
+                            </p:childTnLst>
+                          </p:cTn>
+                        </p:par>
+                        <p:par>
+                          <p:cTn id="33" fill="hold">
+                            <p:stCondLst>
+                              <p:cond delay="4500"/>
+                            </p:stCondLst>
+                            <p:childTnLst>
+                              <p:par>
+                                <p:cTn id="34" presetClass="entr" nodeType="afterEffect" presetID="10" grpId="8" fill="hold">
+                                  <p:stCondLst>
+                                    <p:cond delay="100"/>
+                                  </p:stCondLst>
+                                  <p:iterate type="lt" backwards="0">
+                                    <p:tmAbs val="0"/>
+                                  </p:iterate>
+                                  <p:childTnLst>
+                                    <p:set>
+                                      <p:cBhvr>
+                                        <p:cTn id="35" fill="hold"/>
+                                        <p:tgtEl>
+                                          <p:spTgt spid="196"/>
+                                        </p:tgtEl>
+                                        <p:attrNameLst>
+                                          <p:attrName>style.visibility</p:attrName>
+                                        </p:attrNameLst>
+                                      </p:cBhvr>
+                                      <p:to>
+                                        <p:strVal val="visible"/>
+                                      </p:to>
+                                    </p:set>
+                                    <p:animEffect filter="fade" transition="in">
+                                      <p:cBhvr>
+                                        <p:cTn id="36" dur="800"/>
+                                        <p:tgtEl>
+                                          <p:spTgt spid="196"/>
+                                        </p:tgtEl>
+                                      </p:cBhvr>
+                                    </p:animEffect>
+                                  </p:childTnLst>
+                                </p:cTn>
+                              </p:par>
+                            </p:childTnLst>
+                          </p:cTn>
+                        </p:par>
+                        <p:par>
+                          <p:cTn id="37" fill="hold">
+                            <p:stCondLst>
+                              <p:cond delay="5400"/>
+                            </p:stCondLst>
+                            <p:childTnLst>
+                              <p:par>
+                                <p:cTn id="38" presetClass="entr" nodeType="afterEffect" presetID="9" grpId="9" fill="hold">
+                                  <p:stCondLst>
+                                    <p:cond delay="0"/>
+                                  </p:stCondLst>
+                                  <p:iterate type="el" backwards="0">
+                                    <p:tmAbs val="0"/>
+                                  </p:iterate>
+                                  <p:childTnLst>
+                                    <p:set>
+                                      <p:cBhvr>
+                                        <p:cTn id="39" fill="hold"/>
+                                        <p:tgtEl>
+                                          <p:spTgt spid="192"/>
+                                        </p:tgtEl>
+                                        <p:attrNameLst>
+                                          <p:attrName>style.visibility</p:attrName>
+                                        </p:attrNameLst>
+                                      </p:cBhvr>
+                                      <p:to>
+                                        <p:strVal val="visible"/>
+                                      </p:to>
+                                    </p:set>
+                                    <p:animEffect filter="dissolve" transition="in">
+                                      <p:cBhvr>
+                                        <p:cTn id="40" dur="800"/>
+                                        <p:tgtEl>
+                                          <p:spTgt spid="192"/>
+                                        </p:tgtEl>
+                                      </p:cBhvr>
+                                    </p:animEffect>
+                                  </p:childTnLst>
+                                </p:cTn>
+                              </p:par>
+                            </p:childTnLst>
+                          </p:cTn>
+                        </p:par>
+                        <p:par>
+                          <p:cTn id="41" fill="hold">
+                            <p:stCondLst>
+                              <p:cond delay="6200"/>
+                            </p:stCondLst>
+                            <p:childTnLst>
+                              <p:par>
+                                <p:cTn id="42" presetClass="entr" nodeType="afterEffect" presetID="9" grpId="10" fill="hold">
+                                  <p:stCondLst>
+                                    <p:cond delay="0"/>
+                                  </p:stCondLst>
+                                  <p:iterate type="el" backwards="0">
+                                    <p:tmAbs val="0"/>
+                                  </p:iterate>
+                                  <p:childTnLst>
+                                    <p:set>
+                                      <p:cBhvr>
+                                        <p:cTn id="43" fill="hold"/>
                                         <p:tgtEl>
                                           <p:spTgt spid="197"/>
                                         </p:tgtEl>
@@ -6281,9 +6497,52 @@
                                     </p:set>
                                     <p:animEffect filter="dissolve" transition="in">
                                       <p:cBhvr>
-                                        <p:cTn id="24" dur="300"/>
+                                        <p:cTn id="44" dur="300"/>
                                         <p:tgtEl>
                                           <p:spTgt spid="197"/>
+                                        </p:tgtEl>
+                                      </p:cBhvr>
+                                    </p:animEffect>
+                                  </p:childTnLst>
+                                </p:cTn>
+                              </p:par>
+                            </p:childTnLst>
+                          </p:cTn>
+                        </p:par>
+                        <p:par>
+                          <p:cTn id="45" fill="hold">
+                            <p:stCondLst>
+                              <p:cond delay="6500"/>
+                            </p:stCondLst>
+                            <p:childTnLst>
+                              <p:par>
+                                <p:cTn id="46" presetClass="entr" nodeType="afterEffect" presetID="10" grpId="11" fill="hold">
+                                  <p:stCondLst>
+                                    <p:cond delay="100"/>
+                                  </p:stCondLst>
+                                  <p:iterate type="lt" backwards="0">
+                                    <p:tmAbs val="0"/>
+                                  </p:iterate>
+                                  <p:childTnLst>
+                                    <p:set>
+                                      <p:cBhvr>
+                                        <p:cTn id="47" fill="hold"/>
+                                        <p:tgtEl>
+                                          <p:spTgt spid="199"/>
+                                        </p:tgtEl>
+                                        <p:attrNameLst>
+                                          <p:attrName>style.visibility</p:attrName>
+                                        </p:attrNameLst>
+                                      </p:cBhvr>
+                                      <p:to>
+                                        <p:strVal val="visible"/>
+                                      </p:to>
+                                    </p:set>
+                                    <p:animEffect filter="fade" transition="in">
+                                      <p:cBhvr>
+                                        <p:cTn id="48" dur="800"/>
+                                        <p:tgtEl>
+                                          <p:spTgt spid="199"/>
                                         </p:tgtEl>
                                       </p:cBhvr>
                                     </p:animEffect>
@@ -6318,11 +6577,17 @@
       </p:par>
     </p:tnLst>
     <p:bldLst>
-      <p:bldP build="whole" bldLvl="1" animBg="1" rev="0" advAuto="0" spid="188" grpId="3"/>
-      <p:bldP build="whole" bldLvl="1" animBg="1" rev="0" advAuto="0" spid="197" grpId="5"/>
       <p:bldP build="whole" bldLvl="1" animBg="1" rev="0" advAuto="0" spid="186" grpId="1"/>
-      <p:bldP build="whole" bldLvl="1" animBg="1" rev="0" advAuto="0" spid="194" grpId="4"/>
+      <p:bldP build="whole" bldLvl="1" animBg="1" rev="0" advAuto="0" spid="192" grpId="9"/>
+      <p:bldP build="whole" bldLvl="1" animBg="1" rev="0" advAuto="0" spid="188" grpId="4"/>
+      <p:bldP build="whole" bldLvl="1" animBg="1" rev="0" advAuto="0" spid="190" grpId="3"/>
+      <p:bldP build="whole" bldLvl="1" animBg="1" rev="0" advAuto="0" spid="196" grpId="8"/>
       <p:bldP build="whole" bldLvl="1" animBg="1" rev="0" advAuto="0" spid="187" grpId="2"/>
+      <p:bldP build="whole" bldLvl="1" animBg="1" rev="0" advAuto="0" spid="197" grpId="10"/>
+      <p:bldP build="whole" bldLvl="1" animBg="1" rev="0" advAuto="0" spid="199" grpId="11"/>
+      <p:bldP build="whole" bldLvl="1" animBg="1" rev="0" advAuto="0" spid="191" grpId="6"/>
+      <p:bldP build="whole" bldLvl="1" animBg="1" rev="0" advAuto="0" spid="193" grpId="5"/>
+      <p:bldP build="whole" bldLvl="1" animBg="1" rev="0" advAuto="0" spid="194" grpId="7"/>
     </p:bldLst>
   </p:timing>
 </p:sld>
@@ -6425,8 +6690,8 @@
         </p:nvSpPr>
         <p:spPr>
           <a:xfrm>
-            <a:off x="1775866" y="4614862"/>
-            <a:ext cx="3690951" cy="1108076"/>
+            <a:off x="1273996" y="4487862"/>
+            <a:ext cx="4307206" cy="1362076"/>
           </a:xfrm>
           <a:prstGeom prst="rect">
             <a:avLst/>
@@ -6447,14 +6712,10 @@
           <a:lstStyle/>
           <a:p>
             <a:pPr>
-              <a:defRPr b="1" sz="5600">
+              <a:defRPr sz="7000">
                 <a:solidFill>
                   <a:srgbClr val="FFFFFF"/>
                 </a:solidFill>
-                <a:latin typeface="Avenir Next"/>
-                <a:ea typeface="Avenir Next"/>
-                <a:cs typeface="Avenir Next"/>
-                <a:sym typeface="Avenir Next"/>
               </a:defRPr>
             </a:pPr>
             <a:r>
@@ -6510,8 +6771,8 @@
         </p:nvSpPr>
         <p:spPr>
           <a:xfrm>
-            <a:off x="6198049" y="4614862"/>
-            <a:ext cx="3983254" cy="1108076"/>
+            <a:off x="6398769" y="4487862"/>
+            <a:ext cx="4940174" cy="1362076"/>
           </a:xfrm>
           <a:prstGeom prst="rect">
             <a:avLst/>
@@ -6531,7 +6792,7 @@
           </a:bodyPr>
           <a:lstStyle>
             <a:lvl1pPr>
-              <a:defRPr b="1" sz="5600">
+              <a:defRPr b="1" sz="7000">
                 <a:solidFill>
                   <a:srgbClr val="A6AAA9"/>
                 </a:solidFill>
@@ -6558,8 +6819,8 @@
         </p:nvSpPr>
         <p:spPr>
           <a:xfrm>
-            <a:off x="6198049" y="5937384"/>
-            <a:ext cx="2371675" cy="1108076"/>
+            <a:off x="6398769" y="5937384"/>
+            <a:ext cx="2925700" cy="1362076"/>
           </a:xfrm>
           <a:prstGeom prst="rect">
             <a:avLst/>
@@ -6579,7 +6840,7 @@
           </a:bodyPr>
           <a:lstStyle>
             <a:lvl1pPr>
-              <a:defRPr b="1" sz="5600">
+              <a:defRPr b="1" sz="7000">
                 <a:solidFill>
                   <a:srgbClr val="A6AAA9"/>
                 </a:solidFill>
@@ -6606,8 +6867,8 @@
         </p:nvSpPr>
         <p:spPr>
           <a:xfrm>
-            <a:off x="6198049" y="7259906"/>
-            <a:ext cx="2230857" cy="1108076"/>
+            <a:off x="6398769" y="7386906"/>
+            <a:ext cx="2749678" cy="1362076"/>
           </a:xfrm>
           <a:prstGeom prst="rect">
             <a:avLst/>
@@ -6627,7 +6888,7 @@
           </a:bodyPr>
           <a:lstStyle>
             <a:lvl1pPr>
-              <a:defRPr b="1" sz="5600">
+              <a:defRPr b="1" sz="7000">
                 <a:solidFill>
                   <a:srgbClr val="A6AAA9"/>
                 </a:solidFill>
@@ -6654,8 +6915,8 @@
         </p:nvSpPr>
         <p:spPr>
           <a:xfrm>
-            <a:off x="1775866" y="5937384"/>
-            <a:ext cx="3690951" cy="1108076"/>
+            <a:off x="1273996" y="5937384"/>
+            <a:ext cx="4307206" cy="1362076"/>
           </a:xfrm>
           <a:prstGeom prst="rect">
             <a:avLst/>
@@ -6676,14 +6937,10 @@
           <a:lstStyle/>
           <a:p>
             <a:pPr>
-              <a:defRPr b="1" sz="5600">
+              <a:defRPr sz="7000">
                 <a:solidFill>
                   <a:srgbClr val="FFFFFF"/>
                 </a:solidFill>
-                <a:latin typeface="Avenir Next"/>
-                <a:ea typeface="Avenir Next"/>
-                <a:cs typeface="Avenir Next"/>
-                <a:sym typeface="Avenir Next"/>
               </a:defRPr>
             </a:pPr>
             <a:r>
@@ -6739,8 +6996,8 @@
         </p:nvSpPr>
         <p:spPr>
           <a:xfrm>
-            <a:off x="1775866" y="7259906"/>
-            <a:ext cx="3690951" cy="1108076"/>
+            <a:off x="1273996" y="7386906"/>
+            <a:ext cx="4307206" cy="1362076"/>
           </a:xfrm>
           <a:prstGeom prst="rect">
             <a:avLst/>
@@ -6761,14 +7018,10 @@
           <a:lstStyle/>
           <a:p>
             <a:pPr>
-              <a:defRPr b="1" sz="5600">
+              <a:defRPr sz="7000">
                 <a:solidFill>
                   <a:srgbClr val="FFFFFF"/>
                 </a:solidFill>
-                <a:latin typeface="Avenir Next"/>
-                <a:ea typeface="Avenir Next"/>
-                <a:cs typeface="Avenir Next"/>
-                <a:sym typeface="Avenir Next"/>
               </a:defRPr>
             </a:pPr>
             <a:r>
@@ -6833,6 +7086,542 @@
       </p:transition>
     </mc:Fallback>
   </mc:AlternateContent>
+  <p:timing>
+    <p:tnLst>
+      <p:par>
+        <p:cTn id="1" nodeType="tmRoot" restart="never" dur="indefinite" fill="hold">
+          <p:childTnLst>
+            <p:seq concurrent="1" prevAc="none" nextAc="seek">
+              <p:cTn id="2" nodeType="mainSeq" dur="indefinite" fill="hold">
+                <p:childTnLst>
+                  <p:par>
+                    <p:cTn id="3" fill="hold">
+                      <p:stCondLst>
+                        <p:cond delay="indefinite"/>
+                        <p:cond evt="onBegin">
+                          <p:tn val="2"/>
+                        </p:cond>
+                      </p:stCondLst>
+                      <p:childTnLst>
+                        <p:par>
+                          <p:cTn id="4" fill="hold">
+                            <p:stCondLst>
+                              <p:cond delay="0"/>
+                            </p:stCondLst>
+                            <p:childTnLst>
+                              <p:par>
+                                <p:cTn id="5" presetClass="entr" nodeType="afterEffect" presetSubtype="8" presetID="2" grpId="1" fill="hold">
+                                  <p:stCondLst>
+                                    <p:cond delay="0"/>
+                                  </p:stCondLst>
+                                  <p:iterate type="el" backwards="0">
+                                    <p:tmAbs val="0"/>
+                                  </p:iterate>
+                                  <p:childTnLst>
+                                    <p:set>
+                                      <p:cBhvr>
+                                        <p:cTn id="6" fill="hold"/>
+                                        <p:tgtEl>
+                                          <p:spTgt spid="203"/>
+                                        </p:tgtEl>
+                                        <p:attrNameLst>
+                                          <p:attrName>style.visibility</p:attrName>
+                                        </p:attrNameLst>
+                                      </p:cBhvr>
+                                      <p:to>
+                                        <p:strVal val="visible"/>
+                                      </p:to>
+                                    </p:set>
+                                    <p:anim calcmode="lin" valueType="num">
+                                      <p:cBhvr>
+                                        <p:cTn id="7" dur="500" fill="hold"/>
+                                        <p:tgtEl>
+                                          <p:spTgt spid="203"/>
+                                        </p:tgtEl>
+                                        <p:attrNameLst>
+                                          <p:attrName>ppt_x</p:attrName>
+                                        </p:attrNameLst>
+                                      </p:cBhvr>
+                                      <p:tavLst>
+                                        <p:tav tm="0">
+                                          <p:val>
+                                            <p:strVal val="0-#ppt_w/2"/>
+                                          </p:val>
+                                        </p:tav>
+                                        <p:tav tm="100000">
+                                          <p:val>
+                                            <p:strVal val="#ppt_x"/>
+                                          </p:val>
+                                        </p:tav>
+                                      </p:tavLst>
+                                    </p:anim>
+                                    <p:anim calcmode="lin" valueType="num">
+                                      <p:cBhvr>
+                                        <p:cTn id="8" dur="500" fill="hold"/>
+                                        <p:tgtEl>
+                                          <p:spTgt spid="203"/>
+                                        </p:tgtEl>
+                                        <p:attrNameLst>
+                                          <p:attrName>ppt_y</p:attrName>
+                                        </p:attrNameLst>
+                                      </p:cBhvr>
+                                      <p:tavLst>
+                                        <p:tav tm="0">
+                                          <p:val>
+                                            <p:strVal val="#ppt_y"/>
+                                          </p:val>
+                                        </p:tav>
+                                        <p:tav tm="100000">
+                                          <p:val>
+                                            <p:strVal val="#ppt_y"/>
+                                          </p:val>
+                                        </p:tav>
+                                      </p:tavLst>
+                                    </p:anim>
+                                  </p:childTnLst>
+                                </p:cTn>
+                              </p:par>
+                            </p:childTnLst>
+                          </p:cTn>
+                        </p:par>
+                        <p:par>
+                          <p:cTn id="9" fill="hold">
+                            <p:stCondLst>
+                              <p:cond delay="500"/>
+                            </p:stCondLst>
+                            <p:childTnLst>
+                              <p:par>
+                                <p:cTn id="10" presetClass="entr" nodeType="afterEffect" presetSubtype="32" presetID="23" grpId="2" fill="hold">
+                                  <p:stCondLst>
+                                    <p:cond delay="100"/>
+                                  </p:stCondLst>
+                                  <p:iterate type="el" backwards="0">
+                                    <p:tmAbs val="0"/>
+                                  </p:iterate>
+                                  <p:childTnLst>
+                                    <p:set>
+                                      <p:cBhvr>
+                                        <p:cTn id="11" fill="hold"/>
+                                        <p:tgtEl>
+                                          <p:spTgt spid="204"/>
+                                        </p:tgtEl>
+                                        <p:attrNameLst>
+                                          <p:attrName>style.visibility</p:attrName>
+                                        </p:attrNameLst>
+                                      </p:cBhvr>
+                                      <p:to>
+                                        <p:strVal val="visible"/>
+                                      </p:to>
+                                    </p:set>
+                                    <p:anim calcmode="lin" valueType="num">
+                                      <p:cBhvr>
+                                        <p:cTn id="12" dur="1000" fill="hold"/>
+                                        <p:tgtEl>
+                                          <p:spTgt spid="204"/>
+                                        </p:tgtEl>
+                                        <p:attrNameLst>
+                                          <p:attrName>ppt_w</p:attrName>
+                                        </p:attrNameLst>
+                                      </p:cBhvr>
+                                      <p:tavLst>
+                                        <p:tav tm="0">
+                                          <p:val>
+                                            <p:strVal val="4*#ppt_w"/>
+                                          </p:val>
+                                        </p:tav>
+                                        <p:tav tm="100000">
+                                          <p:val>
+                                            <p:strVal val="#ppt_w"/>
+                                          </p:val>
+                                        </p:tav>
+                                      </p:tavLst>
+                                    </p:anim>
+                                    <p:anim calcmode="lin" valueType="num">
+                                      <p:cBhvr>
+                                        <p:cTn id="13" dur="1000" fill="hold"/>
+                                        <p:tgtEl>
+                                          <p:spTgt spid="204"/>
+                                        </p:tgtEl>
+                                        <p:attrNameLst>
+                                          <p:attrName>ppt_h</p:attrName>
+                                        </p:attrNameLst>
+                                      </p:cBhvr>
+                                      <p:tavLst>
+                                        <p:tav tm="0">
+                                          <p:val>
+                                            <p:strVal val="4*#ppt_h"/>
+                                          </p:val>
+                                        </p:tav>
+                                        <p:tav tm="100000">
+                                          <p:val>
+                                            <p:strVal val="#ppt_h"/>
+                                          </p:val>
+                                        </p:tav>
+                                      </p:tavLst>
+                                    </p:anim>
+                                  </p:childTnLst>
+                                </p:cTn>
+                              </p:par>
+                            </p:childTnLst>
+                          </p:cTn>
+                        </p:par>
+                        <p:par>
+                          <p:cTn id="14" fill="hold">
+                            <p:stCondLst>
+                              <p:cond delay="1600"/>
+                            </p:stCondLst>
+                            <p:childTnLst>
+                              <p:par>
+                                <p:cTn id="15" presetClass="entr" nodeType="afterEffect" presetSubtype="8" presetID="2" grpId="3" fill="hold">
+                                  <p:stCondLst>
+                                    <p:cond delay="0"/>
+                                  </p:stCondLst>
+                                  <p:iterate type="el" backwards="0">
+                                    <p:tmAbs val="0"/>
+                                  </p:iterate>
+                                  <p:childTnLst>
+                                    <p:set>
+                                      <p:cBhvr>
+                                        <p:cTn id="16" fill="hold"/>
+                                        <p:tgtEl>
+                                          <p:spTgt spid="207"/>
+                                        </p:tgtEl>
+                                        <p:attrNameLst>
+                                          <p:attrName>style.visibility</p:attrName>
+                                        </p:attrNameLst>
+                                      </p:cBhvr>
+                                      <p:to>
+                                        <p:strVal val="visible"/>
+                                      </p:to>
+                                    </p:set>
+                                    <p:anim calcmode="lin" valueType="num">
+                                      <p:cBhvr>
+                                        <p:cTn id="17" dur="500" fill="hold"/>
+                                        <p:tgtEl>
+                                          <p:spTgt spid="207"/>
+                                        </p:tgtEl>
+                                        <p:attrNameLst>
+                                          <p:attrName>ppt_x</p:attrName>
+                                        </p:attrNameLst>
+                                      </p:cBhvr>
+                                      <p:tavLst>
+                                        <p:tav tm="0">
+                                          <p:val>
+                                            <p:strVal val="0-#ppt_w/2"/>
+                                          </p:val>
+                                        </p:tav>
+                                        <p:tav tm="100000">
+                                          <p:val>
+                                            <p:strVal val="#ppt_x"/>
+                                          </p:val>
+                                        </p:tav>
+                                      </p:tavLst>
+                                    </p:anim>
+                                    <p:anim calcmode="lin" valueType="num">
+                                      <p:cBhvr>
+                                        <p:cTn id="18" dur="500" fill="hold"/>
+                                        <p:tgtEl>
+                                          <p:spTgt spid="207"/>
+                                        </p:tgtEl>
+                                        <p:attrNameLst>
+                                          <p:attrName>ppt_y</p:attrName>
+                                        </p:attrNameLst>
+                                      </p:cBhvr>
+                                      <p:tavLst>
+                                        <p:tav tm="0">
+                                          <p:val>
+                                            <p:strVal val="#ppt_y"/>
+                                          </p:val>
+                                        </p:tav>
+                                        <p:tav tm="100000">
+                                          <p:val>
+                                            <p:strVal val="#ppt_y"/>
+                                          </p:val>
+                                        </p:tav>
+                                      </p:tavLst>
+                                    </p:anim>
+                                  </p:childTnLst>
+                                </p:cTn>
+                              </p:par>
+                            </p:childTnLst>
+                          </p:cTn>
+                        </p:par>
+                        <p:par>
+                          <p:cTn id="19" fill="hold">
+                            <p:stCondLst>
+                              <p:cond delay="2100"/>
+                            </p:stCondLst>
+                            <p:childTnLst>
+                              <p:par>
+                                <p:cTn id="20" presetClass="entr" nodeType="afterEffect" presetSubtype="32" presetID="23" grpId="4" fill="hold">
+                                  <p:stCondLst>
+                                    <p:cond delay="100"/>
+                                  </p:stCondLst>
+                                  <p:iterate type="el" backwards="0">
+                                    <p:tmAbs val="0"/>
+                                  </p:iterate>
+                                  <p:childTnLst>
+                                    <p:set>
+                                      <p:cBhvr>
+                                        <p:cTn id="21" fill="hold"/>
+                                        <p:tgtEl>
+                                          <p:spTgt spid="205"/>
+                                        </p:tgtEl>
+                                        <p:attrNameLst>
+                                          <p:attrName>style.visibility</p:attrName>
+                                        </p:attrNameLst>
+                                      </p:cBhvr>
+                                      <p:to>
+                                        <p:strVal val="visible"/>
+                                      </p:to>
+                                    </p:set>
+                                    <p:anim calcmode="lin" valueType="num">
+                                      <p:cBhvr>
+                                        <p:cTn id="22" dur="1000" fill="hold"/>
+                                        <p:tgtEl>
+                                          <p:spTgt spid="205"/>
+                                        </p:tgtEl>
+                                        <p:attrNameLst>
+                                          <p:attrName>ppt_w</p:attrName>
+                                        </p:attrNameLst>
+                                      </p:cBhvr>
+                                      <p:tavLst>
+                                        <p:tav tm="0">
+                                          <p:val>
+                                            <p:strVal val="4*#ppt_w"/>
+                                          </p:val>
+                                        </p:tav>
+                                        <p:tav tm="100000">
+                                          <p:val>
+                                            <p:strVal val="#ppt_w"/>
+                                          </p:val>
+                                        </p:tav>
+                                      </p:tavLst>
+                                    </p:anim>
+                                    <p:anim calcmode="lin" valueType="num">
+                                      <p:cBhvr>
+                                        <p:cTn id="23" dur="1000" fill="hold"/>
+                                        <p:tgtEl>
+                                          <p:spTgt spid="205"/>
+                                        </p:tgtEl>
+                                        <p:attrNameLst>
+                                          <p:attrName>ppt_h</p:attrName>
+                                        </p:attrNameLst>
+                                      </p:cBhvr>
+                                      <p:tavLst>
+                                        <p:tav tm="0">
+                                          <p:val>
+                                            <p:strVal val="4*#ppt_h"/>
+                                          </p:val>
+                                        </p:tav>
+                                        <p:tav tm="100000">
+                                          <p:val>
+                                            <p:strVal val="#ppt_h"/>
+                                          </p:val>
+                                        </p:tav>
+                                      </p:tavLst>
+                                    </p:anim>
+                                  </p:childTnLst>
+                                </p:cTn>
+                              </p:par>
+                            </p:childTnLst>
+                          </p:cTn>
+                        </p:par>
+                        <p:par>
+                          <p:cTn id="24" fill="hold">
+                            <p:stCondLst>
+                              <p:cond delay="3200"/>
+                            </p:stCondLst>
+                            <p:childTnLst>
+                              <p:par>
+                                <p:cTn id="25" presetClass="entr" nodeType="afterEffect" presetSubtype="8" presetID="2" grpId="5" fill="hold">
+                                  <p:stCondLst>
+                                    <p:cond delay="0"/>
+                                  </p:stCondLst>
+                                  <p:iterate type="el" backwards="0">
+                                    <p:tmAbs val="0"/>
+                                  </p:iterate>
+                                  <p:childTnLst>
+                                    <p:set>
+                                      <p:cBhvr>
+                                        <p:cTn id="26" fill="hold"/>
+                                        <p:tgtEl>
+                                          <p:spTgt spid="208"/>
+                                        </p:tgtEl>
+                                        <p:attrNameLst>
+                                          <p:attrName>style.visibility</p:attrName>
+                                        </p:attrNameLst>
+                                      </p:cBhvr>
+                                      <p:to>
+                                        <p:strVal val="visible"/>
+                                      </p:to>
+                                    </p:set>
+                                    <p:anim calcmode="lin" valueType="num">
+                                      <p:cBhvr>
+                                        <p:cTn id="27" dur="500" fill="hold"/>
+                                        <p:tgtEl>
+                                          <p:spTgt spid="208"/>
+                                        </p:tgtEl>
+                                        <p:attrNameLst>
+                                          <p:attrName>ppt_x</p:attrName>
+                                        </p:attrNameLst>
+                                      </p:cBhvr>
+                                      <p:tavLst>
+                                        <p:tav tm="0">
+                                          <p:val>
+                                            <p:strVal val="0-#ppt_w/2"/>
+                                          </p:val>
+                                        </p:tav>
+                                        <p:tav tm="100000">
+                                          <p:val>
+                                            <p:strVal val="#ppt_x"/>
+                                          </p:val>
+                                        </p:tav>
+                                      </p:tavLst>
+                                    </p:anim>
+                                    <p:anim calcmode="lin" valueType="num">
+                                      <p:cBhvr>
+                                        <p:cTn id="28" dur="500" fill="hold"/>
+                                        <p:tgtEl>
+                                          <p:spTgt spid="208"/>
+                                        </p:tgtEl>
+                                        <p:attrNameLst>
+                                          <p:attrName>ppt_y</p:attrName>
+                                        </p:attrNameLst>
+                                      </p:cBhvr>
+                                      <p:tavLst>
+                                        <p:tav tm="0">
+                                          <p:val>
+                                            <p:strVal val="#ppt_y"/>
+                                          </p:val>
+                                        </p:tav>
+                                        <p:tav tm="100000">
+                                          <p:val>
+                                            <p:strVal val="#ppt_y"/>
+                                          </p:val>
+                                        </p:tav>
+                                      </p:tavLst>
+                                    </p:anim>
+                                  </p:childTnLst>
+                                </p:cTn>
+                              </p:par>
+                            </p:childTnLst>
+                          </p:cTn>
+                        </p:par>
+                        <p:par>
+                          <p:cTn id="29" fill="hold">
+                            <p:stCondLst>
+                              <p:cond delay="3700"/>
+                            </p:stCondLst>
+                            <p:childTnLst>
+                              <p:par>
+                                <p:cTn id="30" presetClass="entr" nodeType="afterEffect" presetSubtype="32" presetID="23" grpId="6" fill="hold">
+                                  <p:stCondLst>
+                                    <p:cond delay="100"/>
+                                  </p:stCondLst>
+                                  <p:iterate type="el" backwards="0">
+                                    <p:tmAbs val="0"/>
+                                  </p:iterate>
+                                  <p:childTnLst>
+                                    <p:set>
+                                      <p:cBhvr>
+                                        <p:cTn id="31" fill="hold"/>
+                                        <p:tgtEl>
+                                          <p:spTgt spid="206"/>
+                                        </p:tgtEl>
+                                        <p:attrNameLst>
+                                          <p:attrName>style.visibility</p:attrName>
+                                        </p:attrNameLst>
+                                      </p:cBhvr>
+                                      <p:to>
+                                        <p:strVal val="visible"/>
+                                      </p:to>
+                                    </p:set>
+                                    <p:anim calcmode="lin" valueType="num">
+                                      <p:cBhvr>
+                                        <p:cTn id="32" dur="1000" fill="hold"/>
+                                        <p:tgtEl>
+                                          <p:spTgt spid="206"/>
+                                        </p:tgtEl>
+                                        <p:attrNameLst>
+                                          <p:attrName>ppt_w</p:attrName>
+                                        </p:attrNameLst>
+                                      </p:cBhvr>
+                                      <p:tavLst>
+                                        <p:tav tm="0">
+                                          <p:val>
+                                            <p:strVal val="4*#ppt_w"/>
+                                          </p:val>
+                                        </p:tav>
+                                        <p:tav tm="100000">
+                                          <p:val>
+                                            <p:strVal val="#ppt_w"/>
+                                          </p:val>
+                                        </p:tav>
+                                      </p:tavLst>
+                                    </p:anim>
+                                    <p:anim calcmode="lin" valueType="num">
+                                      <p:cBhvr>
+                                        <p:cTn id="33" dur="1000" fill="hold"/>
+                                        <p:tgtEl>
+                                          <p:spTgt spid="206"/>
+                                        </p:tgtEl>
+                                        <p:attrNameLst>
+                                          <p:attrName>ppt_h</p:attrName>
+                                        </p:attrNameLst>
+                                      </p:cBhvr>
+                                      <p:tavLst>
+                                        <p:tav tm="0">
+                                          <p:val>
+                                            <p:strVal val="4*#ppt_h"/>
+                                          </p:val>
+                                        </p:tav>
+                                        <p:tav tm="100000">
+                                          <p:val>
+                                            <p:strVal val="#ppt_h"/>
+                                          </p:val>
+                                        </p:tav>
+                                      </p:tavLst>
+                                    </p:anim>
+                                  </p:childTnLst>
+                                </p:cTn>
+                              </p:par>
+                            </p:childTnLst>
+                          </p:cTn>
+                        </p:par>
+                      </p:childTnLst>
+                    </p:cTn>
+                  </p:par>
+                </p:childTnLst>
+              </p:cTn>
+              <p:prevCondLst>
+                <p:cond evt="onPrev">
+                  <p:tgtEl>
+                    <p:sldTgt/>
+                  </p:tgtEl>
+                </p:cond>
+              </p:prevCondLst>
+              <p:nextCondLst>
+                <p:cond evt="onNext">
+                  <p:tgtEl>
+                    <p:sldTgt/>
+                  </p:tgtEl>
+                </p:cond>
+              </p:nextCondLst>
+            </p:seq>
+          </p:childTnLst>
+        </p:cTn>
+      </p:par>
+    </p:tnLst>
+    <p:bldLst>
+      <p:bldP build="whole" bldLvl="1" animBg="1" rev="0" advAuto="0" spid="207" grpId="3"/>
+      <p:bldP build="whole" bldLvl="1" animBg="1" rev="0" advAuto="0" spid="204" grpId="2"/>
+      <p:bldP build="whole" bldLvl="1" animBg="1" rev="0" advAuto="0" spid="206" grpId="6"/>
+      <p:bldP build="whole" bldLvl="1" animBg="1" rev="0" advAuto="0" spid="205" grpId="4"/>
+      <p:bldP build="whole" bldLvl="1" animBg="1" rev="0" advAuto="0" spid="208" grpId="5"/>
+      <p:bldP build="whole" bldLvl="1" animBg="1" rev="0" advAuto="0" spid="203" grpId="1"/>
+    </p:bldLst>
+  </p:timing>
 </p:sld>
 </file>
 
@@ -6891,7 +7680,7 @@
           <a:p>
             <a:pPr/>
             <a:r>
-              <a:t>flag functions</a:t>
+              <a:t>Cmd flags</a:t>
             </a:r>
           </a:p>
         </p:txBody>
@@ -6925,16 +7714,543 @@
           </a:ln>
         </p:spPr>
       </p:pic>
+      <p:grpSp>
+        <p:nvGrpSpPr>
+          <p:cNvPr id="217" name="Group"/>
+          <p:cNvGrpSpPr/>
+          <p:nvPr/>
+        </p:nvGrpSpPr>
+        <p:grpSpPr>
+          <a:xfrm>
+            <a:off x="1270000" y="4921056"/>
+            <a:ext cx="5582268" cy="5728088"/>
+            <a:chOff x="0" y="0"/>
+            <a:chExt cx="5582267" cy="5728087"/>
+          </a:xfrm>
+        </p:grpSpPr>
+        <p:sp>
+          <p:nvSpPr>
+            <p:cNvPr id="212" name="Rounded Rectangle"/>
+            <p:cNvSpPr/>
+            <p:nvPr/>
+          </p:nvSpPr>
+          <p:spPr>
+            <a:xfrm>
+              <a:off x="0" y="0"/>
+              <a:ext cx="5582268" cy="5728088"/>
+            </a:xfrm>
+            <a:prstGeom prst="roundRect">
+              <a:avLst>
+                <a:gd name="adj" fmla="val 2529"/>
+              </a:avLst>
+            </a:prstGeom>
+            <a:solidFill>
+              <a:srgbClr val="FFFFFF"/>
+            </a:solidFill>
+            <a:ln w="12700" cap="flat">
+              <a:noFill/>
+              <a:miter lim="400000"/>
+            </a:ln>
+            <a:effectLst>
+              <a:outerShdw sx="100000" sy="100000" kx="0" ky="0" algn="b" rotWithShape="0" blurRad="254000" dist="187930" dir="5400000">
+                <a:srgbClr val="000000">
+                  <a:alpha val="50000"/>
+                </a:srgbClr>
+              </a:outerShdw>
+            </a:effectLst>
+          </p:spPr>
+          <p:txBody>
+            <a:bodyPr wrap="square" lIns="71437" tIns="71437" rIns="71437" bIns="71437" numCol="1" anchor="ctr">
+              <a:noAutofit/>
+            </a:bodyPr>
+            <a:lstStyle/>
+            <a:p>
+              <a:pPr algn="ctr">
+                <a:lnSpc>
+                  <a:spcPct val="80000"/>
+                </a:lnSpc>
+                <a:spcBef>
+                  <a:spcPts val="0"/>
+                </a:spcBef>
+                <a:defRPr cap="all" sz="3800">
+                  <a:solidFill>
+                    <a:srgbClr val="FFFFFF"/>
+                  </a:solidFill>
+                  <a:latin typeface="+mn-lt"/>
+                  <a:ea typeface="+mn-ea"/>
+                  <a:cs typeface="+mn-cs"/>
+                  <a:sym typeface="DIN Condensed"/>
+                </a:defRPr>
+              </a:pPr>
+            </a:p>
+          </p:txBody>
+        </p:sp>
+        <p:sp>
+          <p:nvSpPr>
+            <p:cNvPr id="213" name="--id=3"/>
+            <p:cNvSpPr txBox="1"/>
+            <p:nvPr/>
+          </p:nvSpPr>
+          <p:spPr>
+            <a:xfrm>
+              <a:off x="559827" y="450209"/>
+              <a:ext cx="2230858" cy="1108076"/>
+            </a:xfrm>
+            <a:prstGeom prst="rect">
+              <a:avLst/>
+            </a:prstGeom>
+            <a:noFill/>
+            <a:ln w="12700" cap="flat">
+              <a:noFill/>
+              <a:miter lim="400000"/>
+            </a:ln>
+            <a:effectLst/>
+            <a:extLst>
+              <a:ext uri="{C572A759-6A51-4108-AA02-DFA0A04FC94B}">
+                <ma14:wrappingTextBoxFlag xmlns:ma14="http://schemas.microsoft.com/office/mac/drawingml/2011/main" val="1"/>
+              </a:ext>
+            </a:extLst>
+          </p:spPr>
+          <p:txBody>
+            <a:bodyPr wrap="none" lIns="71437" tIns="71437" rIns="71437" bIns="71437" numCol="1" anchor="ctr">
+              <a:spAutoFit/>
+            </a:bodyPr>
+            <a:lstStyle>
+              <a:lvl1pPr>
+                <a:defRPr b="1" sz="5600">
+                  <a:solidFill>
+                    <a:schemeClr val="accent4">
+                      <a:hueOff val="-1395324"/>
+                      <a:satOff val="-3373"/>
+                      <a:lumOff val="-9849"/>
+                    </a:schemeClr>
+                  </a:solidFill>
+                  <a:latin typeface="Avenir Next"/>
+                  <a:ea typeface="Avenir Next"/>
+                  <a:cs typeface="Avenir Next"/>
+                  <a:sym typeface="Avenir Next"/>
+                </a:defRPr>
+              </a:lvl1pPr>
+            </a:lstStyle>
+            <a:p>
+              <a:pPr/>
+              <a:r>
+                <a:t>--id=3</a:t>
+              </a:r>
+            </a:p>
+          </p:txBody>
+        </p:sp>
+        <p:sp>
+          <p:nvSpPr>
+            <p:cNvPr id="214" name="-id=3"/>
+            <p:cNvSpPr txBox="1"/>
+            <p:nvPr/>
+          </p:nvSpPr>
+          <p:spPr>
+            <a:xfrm>
+              <a:off x="559827" y="1690073"/>
+              <a:ext cx="1999006" cy="1108076"/>
+            </a:xfrm>
+            <a:prstGeom prst="rect">
+              <a:avLst/>
+            </a:prstGeom>
+            <a:noFill/>
+            <a:ln w="12700" cap="flat">
+              <a:noFill/>
+              <a:miter lim="400000"/>
+            </a:ln>
+            <a:effectLst/>
+            <a:extLst>
+              <a:ext uri="{C572A759-6A51-4108-AA02-DFA0A04FC94B}">
+                <ma14:wrappingTextBoxFlag xmlns:ma14="http://schemas.microsoft.com/office/mac/drawingml/2011/main" val="1"/>
+              </a:ext>
+            </a:extLst>
+          </p:spPr>
+          <p:txBody>
+            <a:bodyPr wrap="none" lIns="71437" tIns="71437" rIns="71437" bIns="71437" numCol="1" anchor="ctr">
+              <a:spAutoFit/>
+            </a:bodyPr>
+            <a:lstStyle>
+              <a:lvl1pPr>
+                <a:defRPr b="1" sz="5600">
+                  <a:solidFill>
+                    <a:schemeClr val="accent4">
+                      <a:hueOff val="-1395324"/>
+                      <a:satOff val="-3373"/>
+                      <a:lumOff val="-9849"/>
+                    </a:schemeClr>
+                  </a:solidFill>
+                  <a:latin typeface="Avenir Next"/>
+                  <a:ea typeface="Avenir Next"/>
+                  <a:cs typeface="Avenir Next"/>
+                  <a:sym typeface="Avenir Next"/>
+                </a:defRPr>
+              </a:lvl1pPr>
+            </a:lstStyle>
+            <a:p>
+              <a:pPr/>
+              <a:r>
+                <a:t>-id=3</a:t>
+              </a:r>
+            </a:p>
+          </p:txBody>
+        </p:sp>
+        <p:sp>
+          <p:nvSpPr>
+            <p:cNvPr id="215" name="-id 3"/>
+            <p:cNvSpPr txBox="1"/>
+            <p:nvPr/>
+          </p:nvSpPr>
+          <p:spPr>
+            <a:xfrm>
+              <a:off x="559827" y="2929938"/>
+              <a:ext cx="1703147" cy="1108076"/>
+            </a:xfrm>
+            <a:prstGeom prst="rect">
+              <a:avLst/>
+            </a:prstGeom>
+            <a:noFill/>
+            <a:ln w="12700" cap="flat">
+              <a:noFill/>
+              <a:miter lim="400000"/>
+            </a:ln>
+            <a:effectLst/>
+            <a:extLst>
+              <a:ext uri="{C572A759-6A51-4108-AA02-DFA0A04FC94B}">
+                <ma14:wrappingTextBoxFlag xmlns:ma14="http://schemas.microsoft.com/office/mac/drawingml/2011/main" val="1"/>
+              </a:ext>
+            </a:extLst>
+          </p:spPr>
+          <p:txBody>
+            <a:bodyPr wrap="none" lIns="71437" tIns="71437" rIns="71437" bIns="71437" numCol="1" anchor="ctr">
+              <a:spAutoFit/>
+            </a:bodyPr>
+            <a:lstStyle>
+              <a:lvl1pPr>
+                <a:defRPr b="1" sz="5600">
+                  <a:solidFill>
+                    <a:schemeClr val="accent4">
+                      <a:hueOff val="-1395324"/>
+                      <a:satOff val="-3373"/>
+                      <a:lumOff val="-9849"/>
+                    </a:schemeClr>
+                  </a:solidFill>
+                  <a:latin typeface="Avenir Next"/>
+                  <a:ea typeface="Avenir Next"/>
+                  <a:cs typeface="Avenir Next"/>
+                  <a:sym typeface="Avenir Next"/>
+                </a:defRPr>
+              </a:lvl1pPr>
+            </a:lstStyle>
+            <a:p>
+              <a:pPr/>
+              <a:r>
+                <a:t>-id 3</a:t>
+              </a:r>
+            </a:p>
+          </p:txBody>
+        </p:sp>
+        <p:sp>
+          <p:nvSpPr>
+            <p:cNvPr id="216" name="--id 3"/>
+            <p:cNvSpPr txBox="1"/>
+            <p:nvPr/>
+          </p:nvSpPr>
+          <p:spPr>
+            <a:xfrm>
+              <a:off x="559827" y="4169802"/>
+              <a:ext cx="1934998" cy="1108076"/>
+            </a:xfrm>
+            <a:prstGeom prst="rect">
+              <a:avLst/>
+            </a:prstGeom>
+            <a:noFill/>
+            <a:ln w="12700" cap="flat">
+              <a:noFill/>
+              <a:miter lim="400000"/>
+            </a:ln>
+            <a:effectLst/>
+            <a:extLst>
+              <a:ext uri="{C572A759-6A51-4108-AA02-DFA0A04FC94B}">
+                <ma14:wrappingTextBoxFlag xmlns:ma14="http://schemas.microsoft.com/office/mac/drawingml/2011/main" val="1"/>
+              </a:ext>
+            </a:extLst>
+          </p:spPr>
+          <p:txBody>
+            <a:bodyPr wrap="none" lIns="71437" tIns="71437" rIns="71437" bIns="71437" numCol="1" anchor="ctr">
+              <a:spAutoFit/>
+            </a:bodyPr>
+            <a:lstStyle>
+              <a:lvl1pPr>
+                <a:defRPr b="1" sz="5600">
+                  <a:solidFill>
+                    <a:schemeClr val="accent4">
+                      <a:hueOff val="-1395324"/>
+                      <a:satOff val="-3373"/>
+                      <a:lumOff val="-9849"/>
+                    </a:schemeClr>
+                  </a:solidFill>
+                  <a:latin typeface="Avenir Next"/>
+                  <a:ea typeface="Avenir Next"/>
+                  <a:cs typeface="Avenir Next"/>
+                  <a:sym typeface="Avenir Next"/>
+                </a:defRPr>
+              </a:lvl1pPr>
+            </a:lstStyle>
+            <a:p>
+              <a:pPr/>
+              <a:r>
+                <a:t>--id 3</a:t>
+              </a:r>
+            </a:p>
+          </p:txBody>
+        </p:sp>
+      </p:grpSp>
+    </p:spTree>
+  </p:cSld>
+  <p:clrMapOvr>
+    <a:masterClrMapping/>
+  </p:clrMapOvr>
+  <mc:AlternateContent xmlns:mc="http://schemas.openxmlformats.org/markup-compatibility/2006">
+    <mc:Choice xmlns:p14="http://schemas.microsoft.com/office/powerpoint/2010/main" Requires="p14">
+      <p:transition spd="fast" advClick="1" p14:dur="699">
+        <p:push dir="l"/>
+      </p:transition>
+    </mc:Choice>
+    <mc:Fallback>
+      <p:transition spd="fast">
+        <p:fade/>
+      </p:transition>
+    </mc:Fallback>
+  </mc:AlternateContent>
+  <p:timing>
+    <p:tnLst>
+      <p:par>
+        <p:cTn id="1" nodeType="tmRoot" restart="never" dur="indefinite" fill="hold">
+          <p:childTnLst>
+            <p:seq concurrent="1" prevAc="none" nextAc="seek">
+              <p:cTn id="2" nodeType="mainSeq" dur="indefinite" fill="hold">
+                <p:childTnLst>
+                  <p:par>
+                    <p:cTn id="3" fill="hold">
+                      <p:stCondLst>
+                        <p:cond delay="indefinite"/>
+                        <p:cond evt="onBegin">
+                          <p:tn val="2"/>
+                        </p:cond>
+                      </p:stCondLst>
+                      <p:childTnLst>
+                        <p:par>
+                          <p:cTn id="4" fill="hold">
+                            <p:stCondLst>
+                              <p:cond delay="0"/>
+                            </p:stCondLst>
+                            <p:childTnLst>
+                              <p:par>
+                                <p:cTn id="5" presetClass="entr" nodeType="afterEffect" presetSubtype="8" presetID="2" grpId="1" fill="hold">
+                                  <p:stCondLst>
+                                    <p:cond delay="0"/>
+                                  </p:stCondLst>
+                                  <p:iterate type="el" backwards="0">
+                                    <p:tmAbs val="0"/>
+                                  </p:iterate>
+                                  <p:childTnLst>
+                                    <p:set>
+                                      <p:cBhvr>
+                                        <p:cTn id="6" fill="hold"/>
+                                        <p:tgtEl>
+                                          <p:spTgt spid="217"/>
+                                        </p:tgtEl>
+                                        <p:attrNameLst>
+                                          <p:attrName>style.visibility</p:attrName>
+                                        </p:attrNameLst>
+                                      </p:cBhvr>
+                                      <p:to>
+                                        <p:strVal val="visible"/>
+                                      </p:to>
+                                    </p:set>
+                                    <p:anim calcmode="lin" valueType="num">
+                                      <p:cBhvr>
+                                        <p:cTn id="7" dur="700" fill="hold"/>
+                                        <p:tgtEl>
+                                          <p:spTgt spid="217"/>
+                                        </p:tgtEl>
+                                        <p:attrNameLst>
+                                          <p:attrName>ppt_x</p:attrName>
+                                        </p:attrNameLst>
+                                      </p:cBhvr>
+                                      <p:tavLst>
+                                        <p:tav tm="0">
+                                          <p:val>
+                                            <p:strVal val="0-#ppt_w/2"/>
+                                          </p:val>
+                                        </p:tav>
+                                        <p:tav tm="100000">
+                                          <p:val>
+                                            <p:strVal val="#ppt_x"/>
+                                          </p:val>
+                                        </p:tav>
+                                      </p:tavLst>
+                                    </p:anim>
+                                    <p:anim calcmode="lin" valueType="num">
+                                      <p:cBhvr>
+                                        <p:cTn id="8" dur="700" fill="hold"/>
+                                        <p:tgtEl>
+                                          <p:spTgt spid="217"/>
+                                        </p:tgtEl>
+                                        <p:attrNameLst>
+                                          <p:attrName>ppt_y</p:attrName>
+                                        </p:attrNameLst>
+                                      </p:cBhvr>
+                                      <p:tavLst>
+                                        <p:tav tm="0">
+                                          <p:val>
+                                            <p:strVal val="#ppt_y"/>
+                                          </p:val>
+                                        </p:tav>
+                                        <p:tav tm="100000">
+                                          <p:val>
+                                            <p:strVal val="#ppt_y"/>
+                                          </p:val>
+                                        </p:tav>
+                                      </p:tavLst>
+                                    </p:anim>
+                                  </p:childTnLst>
+                                </p:cTn>
+                              </p:par>
+                            </p:childTnLst>
+                          </p:cTn>
+                        </p:par>
+                      </p:childTnLst>
+                    </p:cTn>
+                  </p:par>
+                </p:childTnLst>
+              </p:cTn>
+              <p:prevCondLst>
+                <p:cond evt="onPrev">
+                  <p:tgtEl>
+                    <p:sldTgt/>
+                  </p:tgtEl>
+                </p:cond>
+              </p:prevCondLst>
+              <p:nextCondLst>
+                <p:cond evt="onNext">
+                  <p:tgtEl>
+                    <p:sldTgt/>
+                  </p:tgtEl>
+                </p:cond>
+              </p:nextCondLst>
+            </p:seq>
+          </p:childTnLst>
+        </p:cTn>
+      </p:par>
+    </p:tnLst>
+    <p:bldLst>
+      <p:bldP build="whole" bldLvl="1" animBg="1" rev="0" advAuto="0" spid="217" grpId="1"/>
+    </p:bldLst>
+  </p:timing>
+</p:sld>
+</file>
+
+<file path=ppt/slides/slide5.xml><?xml version="1.0" encoding="utf-8"?>
+<p:sld xmlns:a="http://schemas.openxmlformats.org/drawingml/2006/main" xmlns:r="http://schemas.openxmlformats.org/officeDocument/2006/relationships" xmlns:p="http://schemas.openxmlformats.org/presentationml/2006/main" xmlns:m="http://schemas.openxmlformats.org/officeDocument/2006/math" xmlns:a14="http://schemas.microsoft.com/office/drawing/2010/main" showMasterSp="1" showMasterPhAnim="1">
+  <p:cSld>
+    <p:bg>
+      <p:bgPr>
+        <a:solidFill>
+          <a:srgbClr val="002833"/>
+        </a:solidFill>
+      </p:bgPr>
+    </p:bg>
+    <p:spTree>
+      <p:nvGrpSpPr>
+        <p:cNvPr id="1" name=""/>
+        <p:cNvGrpSpPr/>
+        <p:nvPr/>
+      </p:nvGrpSpPr>
+      <p:grpSpPr>
+        <a:xfrm>
+          <a:off x="0" y="0"/>
+          <a:ext cx="0" cy="0"/>
+          <a:chOff x="0" y="0"/>
+          <a:chExt cx="0" cy="0"/>
+        </a:xfrm>
+      </p:grpSpPr>
       <p:sp>
         <p:nvSpPr>
-          <p:cNvPr id="212" name="String(name string, value string, usage string) *string"/>
+          <p:cNvPr id="219" name="Title 6"/>
+          <p:cNvSpPr txBox="1"/>
+          <p:nvPr>
+            <p:ph type="title"/>
+          </p:nvPr>
+        </p:nvSpPr>
+        <p:spPr>
+          <a:xfrm>
+            <a:off x="5015634" y="1119893"/>
+            <a:ext cx="14352732" cy="1288881"/>
+          </a:xfrm>
+          <a:prstGeom prst="rect">
+            <a:avLst/>
+          </a:prstGeom>
+        </p:spPr>
+        <p:txBody>
+          <a:bodyPr/>
+          <a:lstStyle>
+            <a:lvl1pPr algn="ctr">
+              <a:defRPr sz="8000">
+                <a:solidFill>
+                  <a:srgbClr val="66C2FF"/>
+                </a:solidFill>
+              </a:defRPr>
+            </a:lvl1pPr>
+          </a:lstStyle>
+          <a:p>
+            <a:pPr/>
+            <a:r>
+              <a:t>flag functions</a:t>
+            </a:r>
+          </a:p>
+        </p:txBody>
+      </p:sp>
+      <p:pic>
+        <p:nvPicPr>
+          <p:cNvPr id="220" name="stopwatch (2).png" descr="stopwatch (2).png"/>
+          <p:cNvPicPr>
+            <a:picLocks noChangeAspect="1"/>
+          </p:cNvPicPr>
+          <p:nvPr/>
+        </p:nvPicPr>
+        <p:blipFill>
+          <a:blip r:embed="rId2">
+            <a:extLst/>
+          </a:blip>
+          <a:stretch>
+            <a:fillRect/>
+          </a:stretch>
+        </p:blipFill>
+        <p:spPr>
+          <a:xfrm>
+            <a:off x="22225000" y="2032000"/>
+            <a:ext cx="1270000" cy="1485243"/>
+          </a:xfrm>
+          <a:prstGeom prst="rect">
+            <a:avLst/>
+          </a:prstGeom>
+          <a:ln w="12700">
+            <a:miter lim="400000"/>
+          </a:ln>
+        </p:spPr>
+      </p:pic>
+      <p:sp>
+        <p:nvSpPr>
+          <p:cNvPr id="221" name="String(name string, value string, usage string) *string"/>
           <p:cNvSpPr txBox="1"/>
           <p:nvPr/>
         </p:nvSpPr>
         <p:spPr>
           <a:xfrm>
             <a:off x="7541098" y="4697412"/>
-            <a:ext cx="14189812" cy="942976"/>
+            <a:ext cx="14475487" cy="942976"/>
           </a:xfrm>
           <a:prstGeom prst="rect">
             <a:avLst/>
@@ -6989,7 +8305,7 @@
               <a:t>(</a:t>
             </a:r>
             <a:r>
-              <a:rPr>
+              <a:rPr b="1">
                 <a:solidFill>
                   <a:schemeClr val="accent4"/>
                 </a:solidFill>
@@ -7033,7 +8349,7 @@
               <a:t>, </a:t>
             </a:r>
             <a:r>
-              <a:rPr>
+              <a:rPr b="1">
                 <a:solidFill>
                   <a:schemeClr val="accent4"/>
                 </a:solidFill>
@@ -7077,7 +8393,7 @@
               <a:t>, </a:t>
             </a:r>
             <a:r>
-              <a:rPr>
+              <a:rPr b="1">
                 <a:solidFill>
                   <a:schemeClr val="accent4"/>
                 </a:solidFill>
@@ -7113,21 +8429,21 @@
       </p:sp>
       <p:grpSp>
         <p:nvGrpSpPr>
-          <p:cNvPr id="215" name="Group"/>
+          <p:cNvPr id="224" name="Group"/>
           <p:cNvGrpSpPr/>
           <p:nvPr/>
         </p:nvGrpSpPr>
         <p:grpSpPr>
           <a:xfrm>
-            <a:off x="1269999" y="4385234"/>
-            <a:ext cx="5582269" cy="6799732"/>
+            <a:off x="1270000" y="4385234"/>
+            <a:ext cx="5582268" cy="6799732"/>
             <a:chOff x="0" y="0"/>
             <a:chExt cx="5582267" cy="6799730"/>
           </a:xfrm>
         </p:grpSpPr>
         <p:sp>
           <p:nvSpPr>
-            <p:cNvPr id="213" name="Rounded Rectangle"/>
+            <p:cNvPr id="222" name="Rounded Rectangle"/>
             <p:cNvSpPr/>
             <p:nvPr/>
           </p:nvSpPr>
@@ -7184,7 +8500,7 @@
         </p:sp>
         <p:sp>
           <p:nvSpPr>
-            <p:cNvPr id="214" name="string…"/>
+            <p:cNvPr id="223" name="string…"/>
             <p:cNvSpPr txBox="1"/>
             <p:nvPr/>
           </p:nvSpPr>
@@ -7505,14 +8821,14 @@
       </p:grpSp>
       <p:sp>
         <p:nvSpPr>
-          <p:cNvPr id="216" name="StringVar(p *string, name string, value string, usage string)"/>
+          <p:cNvPr id="225" name="StringVar(p *string, name string, value string, usage string)"/>
           <p:cNvSpPr txBox="1"/>
           <p:nvPr/>
         </p:nvSpPr>
         <p:spPr>
           <a:xfrm>
-            <a:off x="7541098" y="5689304"/>
-            <a:ext cx="15777084" cy="942976"/>
+            <a:off x="7541098" y="5689303"/>
+            <a:ext cx="16075610" cy="942976"/>
           </a:xfrm>
           <a:prstGeom prst="rect">
             <a:avLst/>
@@ -7567,7 +8883,7 @@
               <a:t>(</a:t>
             </a:r>
             <a:r>
-              <a:rPr>
+              <a:rPr b="1">
                 <a:solidFill>
                   <a:schemeClr val="accent4"/>
                 </a:solidFill>
@@ -7611,7 +8927,7 @@
               <a:t>, </a:t>
             </a:r>
             <a:r>
-              <a:rPr>
+              <a:rPr b="1">
                 <a:solidFill>
                   <a:schemeClr val="accent4"/>
                 </a:solidFill>
@@ -7655,7 +8971,7 @@
               <a:t>, </a:t>
             </a:r>
             <a:r>
-              <a:rPr>
+              <a:rPr b="1">
                 <a:solidFill>
                   <a:schemeClr val="accent4"/>
                 </a:solidFill>
@@ -7699,7 +9015,7 @@
               <a:t>, </a:t>
             </a:r>
             <a:r>
-              <a:rPr>
+              <a:rPr b="1">
                 <a:solidFill>
                   <a:schemeClr val="accent4"/>
                 </a:solidFill>
@@ -7798,7 +9114,7 @@
                                       <p:cBhvr>
                                         <p:cTn id="6" fill="hold"/>
                                         <p:tgtEl>
-                                          <p:spTgt spid="215"/>
+                                          <p:spTgt spid="224"/>
                                         </p:tgtEl>
                                         <p:attrNameLst>
                                           <p:attrName>style.visibility</p:attrName>
@@ -7812,7 +9128,7 @@
                                       <p:cBhvr>
                                         <p:cTn id="7" dur="700" fill="hold"/>
                                         <p:tgtEl>
-                                          <p:spTgt spid="215"/>
+                                          <p:spTgt spid="224"/>
                                         </p:tgtEl>
                                         <p:attrNameLst>
                                           <p:attrName>ppt_x</p:attrName>
@@ -7835,7 +9151,7 @@
                                       <p:cBhvr>
                                         <p:cTn id="8" dur="700" fill="hold"/>
                                         <p:tgtEl>
-                                          <p:spTgt spid="215"/>
+                                          <p:spTgt spid="224"/>
                                         </p:tgtEl>
                                         <p:attrNameLst>
                                           <p:attrName>ppt_y</p:attrName>
@@ -7854,6 +9170,76 @@
                                         </p:tav>
                                       </p:tavLst>
                                     </p:anim>
+                                  </p:childTnLst>
+                                </p:cTn>
+                              </p:par>
+                            </p:childTnLst>
+                          </p:cTn>
+                        </p:par>
+                        <p:par>
+                          <p:cTn id="9" fill="hold">
+                            <p:stCondLst>
+                              <p:cond delay="700"/>
+                            </p:stCondLst>
+                            <p:childTnLst>
+                              <p:par>
+                                <p:cTn id="10" presetClass="entr" nodeType="afterEffect" presetSubtype="0" presetID="1" grpId="2" fill="hold">
+                                  <p:stCondLst>
+                                    <p:cond delay="0"/>
+                                  </p:stCondLst>
+                                  <p:iterate type="lt" backwards="0">
+                                    <p:tmAbs val="100"/>
+                                  </p:iterate>
+                                  <p:childTnLst>
+                                    <p:set>
+                                      <p:cBhvr>
+                                        <p:cTn id="11" fill="hold"/>
+                                        <p:tgtEl>
+                                          <p:spTgt spid="221"/>
+                                        </p:tgtEl>
+                                        <p:attrNameLst>
+                                          <p:attrName>style.visibility</p:attrName>
+                                        </p:attrNameLst>
+                                      </p:cBhvr>
+                                      <p:to>
+                                        <p:strVal val="visible"/>
+                                      </p:to>
+                                    </p:set>
+                                  </p:childTnLst>
+                                </p:cTn>
+                              </p:par>
+                            </p:childTnLst>
+                          </p:cTn>
+                        </p:par>
+                        <p:par>
+                          <p:cTn id="12" fill="hold">
+                            <p:stCondLst>
+                              <p:cond delay="700"/>
+                            </p:stCondLst>
+                            <p:childTnLst>
+                              <p:par>
+                                <p:cTn id="13" presetClass="entr" nodeType="afterEffect" presetSubtype="0" presetID="1" grpId="3" fill="hold">
+                                  <p:stCondLst>
+                                    <p:cond delay="0"/>
+                                  </p:stCondLst>
+                                  <p:iterate type="lt" backwards="0">
+                                    <p:tmAbs val="100"/>
+                                  </p:iterate>
+                                  <p:childTnLst>
+                                    <p:set>
+                                      <p:cBhvr>
+                                        <p:cTn id="14" fill="hold"/>
+                                        <p:tgtEl>
+                                          <p:spTgt spid="225"/>
+                                        </p:tgtEl>
+                                        <p:attrNameLst>
+                                          <p:attrName>style.visibility</p:attrName>
+                                        </p:attrNameLst>
+                                      </p:cBhvr>
+                                      <p:to>
+                                        <p:strVal val="visible"/>
+                                      </p:to>
+                                    </p:set>
                                   </p:childTnLst>
                                 </p:cTn>
                               </p:par>
@@ -7885,13 +9271,15 @@
       </p:par>
     </p:tnLst>
     <p:bldLst>
-      <p:bldP build="whole" bldLvl="1" animBg="1" rev="0" advAuto="0" spid="215" grpId="1"/>
+      <p:bldP build="whole" bldLvl="1" animBg="1" rev="0" advAuto="0" spid="225" grpId="3"/>
+      <p:bldP build="whole" bldLvl="1" animBg="1" rev="0" advAuto="0" spid="224" grpId="1"/>
+      <p:bldP build="whole" bldLvl="1" animBg="1" rev="0" advAuto="0" spid="221" grpId="2"/>
     </p:bldLst>
   </p:timing>
 </p:sld>
 </file>
 
-<file path=ppt/slides/slide5.xml><?xml version="1.0" encoding="utf-8"?>
+<file path=ppt/slides/slide6.xml><?xml version="1.0" encoding="utf-8"?>
 <p:sld xmlns:a="http://schemas.openxmlformats.org/drawingml/2006/main" xmlns:r="http://schemas.openxmlformats.org/officeDocument/2006/relationships" xmlns:p="http://schemas.openxmlformats.org/presentationml/2006/main" xmlns:m="http://schemas.openxmlformats.org/officeDocument/2006/math" xmlns:a14="http://schemas.microsoft.com/office/drawing/2010/main" showMasterSp="1" showMasterPhAnim="1">
   <p:cSld>
     <p:bg>
@@ -7917,7 +9305,7 @@
       </p:grpSpPr>
       <p:sp>
         <p:nvSpPr>
-          <p:cNvPr id="218" name="Title 6"/>
+          <p:cNvPr id="227" name="Title 6"/>
           <p:cNvSpPr txBox="1"/>
           <p:nvPr>
             <p:ph type="title"/>
@@ -7953,7 +9341,7 @@
       </p:sp>
       <p:pic>
         <p:nvPicPr>
-          <p:cNvPr id="219" name="stopwatch (2).png" descr="stopwatch (2).png"/>
+          <p:cNvPr id="228" name="stopwatch (2).png" descr="stopwatch (2).png"/>
           <p:cNvPicPr>
             <a:picLocks noChangeAspect="1"/>
           </p:cNvPicPr>
@@ -7982,14 +9370,14 @@
       </p:pic>
       <p:sp>
         <p:nvSpPr>
-          <p:cNvPr id="220" name="flag.NewFlagSet(name string, errorHandling ErrorHandling) *FlagSet"/>
+          <p:cNvPr id="229" name="flag.NewFlagSet(name string, errorHandling ErrorHandling) *FlagSet"/>
           <p:cNvSpPr txBox="1"/>
           <p:nvPr/>
         </p:nvSpPr>
         <p:spPr>
           <a:xfrm>
-            <a:off x="1270000" y="3670404"/>
-            <a:ext cx="18759424" cy="942976"/>
+            <a:off x="1270000" y="3670405"/>
+            <a:ext cx="19093587" cy="942976"/>
           </a:xfrm>
           <a:prstGeom prst="rect">
             <a:avLst/>
@@ -8044,7 +9432,7 @@
               <a:t>(</a:t>
             </a:r>
             <a:r>
-              <a:rPr>
+              <a:rPr b="1">
                 <a:solidFill>
                   <a:schemeClr val="accent4"/>
                 </a:solidFill>
@@ -8088,7 +9476,7 @@
               <a:t>, </a:t>
             </a:r>
             <a:r>
-              <a:rPr>
+              <a:rPr b="1">
                 <a:solidFill>
                   <a:schemeClr val="accent4"/>
                 </a:solidFill>
@@ -8148,21 +9536,21 @@
       </p:sp>
       <p:grpSp>
         <p:nvGrpSpPr>
-          <p:cNvPr id="223" name="Group"/>
+          <p:cNvPr id="232" name="Group"/>
           <p:cNvGrpSpPr/>
           <p:nvPr/>
         </p:nvGrpSpPr>
         <p:grpSpPr>
           <a:xfrm>
-            <a:off x="1270000" y="4973064"/>
-            <a:ext cx="5582268" cy="6799732"/>
+            <a:off x="1270000" y="5100064"/>
+            <a:ext cx="5582268" cy="6799731"/>
             <a:chOff x="0" y="0"/>
             <a:chExt cx="5582267" cy="6799730"/>
           </a:xfrm>
         </p:grpSpPr>
         <p:sp>
           <p:nvSpPr>
-            <p:cNvPr id="221" name="Rounded Rectangle"/>
+            <p:cNvPr id="230" name="Rounded Rectangle"/>
             <p:cNvSpPr/>
             <p:nvPr/>
           </p:nvSpPr>
@@ -8219,7 +9607,7 @@
         </p:sp>
         <p:sp>
           <p:nvSpPr>
-            <p:cNvPr id="222" name="string…"/>
+            <p:cNvPr id="231" name="string…"/>
             <p:cNvSpPr txBox="1"/>
             <p:nvPr/>
           </p:nvSpPr>
@@ -8579,7 +9967,42 @@
                             </p:stCondLst>
                             <p:childTnLst>
                               <p:par>
-                                <p:cTn id="5" presetClass="entr" nodeType="afterEffect" presetSubtype="8" presetID="2" grpId="1" fill="hold">
+                                <p:cTn id="5" presetClass="entr" nodeType="afterEffect" presetSubtype="0" presetID="1" grpId="1" fill="hold">
+                                  <p:stCondLst>
+                                    <p:cond delay="0"/>
+                                  </p:stCondLst>
+                                  <p:iterate type="lt" backwards="0">
+                                    <p:tmAbs val="100"/>
+                                  </p:iterate>
+                                  <p:childTnLst>
+                                    <p:set>
+                                      <p:cBhvr>
+                                        <p:cTn id="6" fill="hold"/>
+                                        <p:tgtEl>
+                                          <p:spTgt spid="229"/>
+                                        </p:tgtEl>
+                                        <p:attrNameLst>
+                                          <p:attrName>style.visibility</p:attrName>
+                                        </p:attrNameLst>
+                                      </p:cBhvr>
+                                      <p:to>
+                                        <p:strVal val="visible"/>
+                                      </p:to>
+                                    </p:set>
+                                  </p:childTnLst>
+                                </p:cTn>
+                              </p:par>
+                            </p:childTnLst>
+                          </p:cTn>
+                        </p:par>
+                        <p:par>
+                          <p:cTn id="7" fill="hold">
+                            <p:stCondLst>
+                              <p:cond delay="0"/>
+                            </p:stCondLst>
+                            <p:childTnLst>
+                              <p:par>
+                                <p:cTn id="8" presetClass="entr" nodeType="afterEffect" presetSubtype="8" presetID="2" grpId="2" fill="hold">
                                   <p:stCondLst>
                                     <p:cond delay="0"/>
                                   </p:stCondLst>
@@ -8589,9 +10012,9 @@
                                   <p:childTnLst>
                                     <p:set>
                                       <p:cBhvr>
-                                        <p:cTn id="6" fill="hold"/>
+                                        <p:cTn id="9" fill="hold"/>
                                         <p:tgtEl>
-                                          <p:spTgt spid="223"/>
+                                          <p:spTgt spid="232"/>
                                         </p:tgtEl>
                                         <p:attrNameLst>
                                           <p:attrName>style.visibility</p:attrName>
@@ -8603,9 +10026,9 @@
                                     </p:set>
                                     <p:anim calcmode="lin" valueType="num">
                                       <p:cBhvr>
-                                        <p:cTn id="7" dur="700" fill="hold"/>
+                                        <p:cTn id="10" dur="700" fill="hold"/>
                                         <p:tgtEl>
-                                          <p:spTgt spid="223"/>
+                                          <p:spTgt spid="232"/>
                                         </p:tgtEl>
                                         <p:attrNameLst>
                                           <p:attrName>ppt_x</p:attrName>
@@ -8626,9 +10049,9 @@
                                     </p:anim>
                                     <p:anim calcmode="lin" valueType="num">
                                       <p:cBhvr>
-                                        <p:cTn id="8" dur="700" fill="hold"/>
+                                        <p:cTn id="11" dur="700" fill="hold"/>
                                         <p:tgtEl>
-                                          <p:spTgt spid="223"/>
+                                          <p:spTgt spid="232"/>
                                         </p:tgtEl>
                                         <p:attrNameLst>
                                           <p:attrName>ppt_y</p:attrName>
@@ -8678,13 +10101,14 @@
       </p:par>
     </p:tnLst>
     <p:bldLst>
-      <p:bldP build="whole" bldLvl="1" animBg="1" rev="0" advAuto="0" spid="223" grpId="1"/>
+      <p:bldP build="whole" bldLvl="1" animBg="1" rev="0" advAuto="0" spid="232" grpId="2"/>
+      <p:bldP build="whole" bldLvl="1" animBg="1" rev="0" advAuto="0" spid="229" grpId="1"/>
     </p:bldLst>
   </p:timing>
 </p:sld>
 </file>
 
-<file path=ppt/slides/slide6.xml><?xml version="1.0" encoding="utf-8"?>
+<file path=ppt/slides/slide7.xml><?xml version="1.0" encoding="utf-8"?>
 <p:sld xmlns:a="http://schemas.openxmlformats.org/drawingml/2006/main" xmlns:r="http://schemas.openxmlformats.org/officeDocument/2006/relationships" xmlns:p="http://schemas.openxmlformats.org/presentationml/2006/main" xmlns:m="http://schemas.openxmlformats.org/officeDocument/2006/math" xmlns:a14="http://schemas.microsoft.com/office/drawing/2010/main" showMasterSp="1" showMasterPhAnim="1">
   <p:cSld>
     <p:bg>
@@ -8710,7 +10134,7 @@
       </p:grpSpPr>
       <p:sp>
         <p:nvSpPr>
-          <p:cNvPr id="225" name="Title 6"/>
+          <p:cNvPr id="234" name="Title 6"/>
           <p:cNvSpPr txBox="1"/>
           <p:nvPr>
             <p:ph type="title"/>
@@ -8746,7 +10170,7 @@
       </p:sp>
       <p:pic>
         <p:nvPicPr>
-          <p:cNvPr id="226" name="stopwatch (2).png" descr="stopwatch (2).png"/>
+          <p:cNvPr id="235" name="stopwatch (2).png" descr="stopwatch (2).png"/>
           <p:cNvPicPr>
             <a:picLocks noChangeAspect="1"/>
           </p:cNvPicPr>
@@ -8775,7 +10199,7 @@
       </p:pic>
       <p:grpSp>
         <p:nvGrpSpPr>
-          <p:cNvPr id="229" name="Group"/>
+          <p:cNvPr id="238" name="Group"/>
           <p:cNvGrpSpPr/>
           <p:nvPr/>
         </p:nvGrpSpPr>
@@ -8789,7 +10213,7 @@
         </p:grpSpPr>
         <p:sp>
           <p:nvSpPr>
-            <p:cNvPr id="227" name="Rounded Rectangle"/>
+            <p:cNvPr id="236" name="Rounded Rectangle"/>
             <p:cNvSpPr/>
             <p:nvPr/>
           </p:nvSpPr>
@@ -8846,7 +10270,7 @@
         </p:sp>
         <p:sp>
           <p:nvSpPr>
-            <p:cNvPr id="228" name="type Value interface {…"/>
+            <p:cNvPr id="237" name="type Value interface {…"/>
             <p:cNvSpPr txBox="1"/>
             <p:nvPr/>
           </p:nvSpPr>
@@ -9152,7 +10576,7 @@
                                       <p:cBhvr>
                                         <p:cTn id="6" fill="hold"/>
                                         <p:tgtEl>
-                                          <p:spTgt spid="229"/>
+                                          <p:spTgt spid="238"/>
                                         </p:tgtEl>
                                         <p:attrNameLst>
                                           <p:attrName>style.visibility</p:attrName>
@@ -9166,7 +10590,7 @@
                                       <p:cBhvr>
                                         <p:cTn id="7" dur="700" fill="hold"/>
                                         <p:tgtEl>
-                                          <p:spTgt spid="229"/>
+                                          <p:spTgt spid="238"/>
                                         </p:tgtEl>
                                         <p:attrNameLst>
                                           <p:attrName>ppt_x</p:attrName>
@@ -9189,7 +10613,7 @@
                                       <p:cBhvr>
                                         <p:cTn id="8" dur="700" fill="hold"/>
                                         <p:tgtEl>
-                                          <p:spTgt spid="229"/>
+                                          <p:spTgt spid="238"/>
                                         </p:tgtEl>
                                         <p:attrNameLst>
                                           <p:attrName>ppt_y</p:attrName>
@@ -9239,13 +10663,13 @@
       </p:par>
     </p:tnLst>
     <p:bldLst>
-      <p:bldP build="whole" bldLvl="1" animBg="1" rev="0" advAuto="0" spid="229" grpId="1"/>
+      <p:bldP build="whole" bldLvl="1" animBg="1" rev="0" advAuto="0" spid="238" grpId="1"/>
     </p:bldLst>
   </p:timing>
 </p:sld>
 </file>
 
-<file path=ppt/slides/slide7.xml><?xml version="1.0" encoding="utf-8"?>
+<file path=ppt/slides/slide8.xml><?xml version="1.0" encoding="utf-8"?>
 <p:sld xmlns:a="http://schemas.openxmlformats.org/drawingml/2006/main" xmlns:r="http://schemas.openxmlformats.org/officeDocument/2006/relationships" xmlns:p="http://schemas.openxmlformats.org/presentationml/2006/main" xmlns:m="http://schemas.openxmlformats.org/officeDocument/2006/math" xmlns:a14="http://schemas.microsoft.com/office/drawing/2010/main" showMasterSp="1" showMasterPhAnim="1">
   <p:cSld>
     <p:bg>
@@ -9271,7 +10695,7 @@
       </p:grpSpPr>
       <p:sp>
         <p:nvSpPr>
-          <p:cNvPr id="231" name="Title 6"/>
+          <p:cNvPr id="240" name="Title 6"/>
           <p:cNvSpPr txBox="1"/>
           <p:nvPr>
             <p:ph type="title"/>
@@ -9307,7 +10731,7 @@
       </p:sp>
       <p:pic>
         <p:nvPicPr>
-          <p:cNvPr id="232" name="stopwatch (2).png" descr="stopwatch (2).png"/>
+          <p:cNvPr id="241" name="stopwatch (2).png" descr="stopwatch (2).png"/>
           <p:cNvPicPr>
             <a:picLocks noChangeAspect="1"/>
           </p:cNvPicPr>
@@ -9336,7 +10760,7 @@
       </p:pic>
       <p:grpSp>
         <p:nvGrpSpPr>
-          <p:cNvPr id="235" name="Group"/>
+          <p:cNvPr id="244" name="Group"/>
           <p:cNvGrpSpPr/>
           <p:nvPr/>
         </p:nvGrpSpPr>
@@ -9350,7 +10774,7 @@
         </p:grpSpPr>
         <p:pic>
           <p:nvPicPr>
-            <p:cNvPr id="233" name="businessman.png" descr="businessman.png"/>
+            <p:cNvPr id="242" name="businessman.png" descr="businessman.png"/>
             <p:cNvPicPr>
               <a:picLocks noChangeAspect="1"/>
             </p:cNvPicPr>
@@ -9387,7 +10811,7 @@
         </p:pic>
         <p:sp>
           <p:nvSpPr>
-            <p:cNvPr id="234" name="Employee, 24y"/>
+            <p:cNvPr id="243" name="Employee, 24y"/>
             <p:cNvSpPr txBox="1"/>
             <p:nvPr/>
           </p:nvSpPr>
@@ -9439,7 +10863,7 @@
       </p:grpSp>
       <p:grpSp>
         <p:nvGrpSpPr>
-          <p:cNvPr id="238" name="Group"/>
+          <p:cNvPr id="247" name="Group"/>
           <p:cNvGrpSpPr/>
           <p:nvPr/>
         </p:nvGrpSpPr>
@@ -9453,7 +10877,7 @@
         </p:grpSpPr>
         <p:pic>
           <p:nvPicPr>
-            <p:cNvPr id="236" name="man (1).png" descr="man (1).png"/>
+            <p:cNvPr id="245" name="man (1).png" descr="man (1).png"/>
             <p:cNvPicPr>
               <a:picLocks noChangeAspect="1"/>
             </p:cNvPicPr>
@@ -9490,7 +10914,7 @@
         </p:pic>
         <p:sp>
           <p:nvSpPr>
-            <p:cNvPr id="237" name="Student, 19y"/>
+            <p:cNvPr id="246" name="Student, 19y"/>
             <p:cNvSpPr txBox="1"/>
             <p:nvPr/>
           </p:nvSpPr>
@@ -9542,7 +10966,7 @@
       </p:grpSp>
       <p:grpSp>
         <p:nvGrpSpPr>
-          <p:cNvPr id="241" name="Group"/>
+          <p:cNvPr id="250" name="Group"/>
           <p:cNvGrpSpPr/>
           <p:nvPr/>
         </p:nvGrpSpPr>
@@ -9556,7 +10980,7 @@
         </p:grpSpPr>
         <p:pic>
           <p:nvPicPr>
-            <p:cNvPr id="239" name="girl.png" descr="girl.png"/>
+            <p:cNvPr id="248" name="girl.png" descr="girl.png"/>
             <p:cNvPicPr>
               <a:picLocks noChangeAspect="1"/>
             </p:cNvPicPr>
@@ -9594,7 +11018,7 @@
         </p:pic>
         <p:sp>
           <p:nvSpPr>
-            <p:cNvPr id="240" name="Kid, 12y"/>
+            <p:cNvPr id="249" name="Kid, 12y"/>
             <p:cNvSpPr txBox="1"/>
             <p:nvPr/>
           </p:nvSpPr>
@@ -9646,7 +11070,7 @@
       </p:grpSp>
       <p:pic>
         <p:nvPicPr>
-          <p:cNvPr id="242" name="beer (1).png" descr="beer (1).png"/>
+          <p:cNvPr id="251" name="beer (1).png" descr="beer (1).png"/>
           <p:cNvPicPr>
             <a:picLocks noChangeAspect="1"/>
           </p:cNvPicPr>
@@ -9682,7 +11106,7 @@
       </p:pic>
       <p:grpSp>
         <p:nvGrpSpPr>
-          <p:cNvPr id="245" name="Group"/>
+          <p:cNvPr id="254" name="Group"/>
           <p:cNvGrpSpPr/>
           <p:nvPr/>
         </p:nvGrpSpPr>
@@ -9696,7 +11120,7 @@
         </p:grpSpPr>
         <p:sp>
           <p:nvSpPr>
-            <p:cNvPr id="243" name="Rounded Rectangle"/>
+            <p:cNvPr id="252" name="Rounded Rectangle"/>
             <p:cNvSpPr/>
             <p:nvPr/>
           </p:nvSpPr>
@@ -9753,7 +11177,7 @@
         </p:sp>
         <p:sp>
           <p:nvSpPr>
-            <p:cNvPr id="244" name="type Buyer interface {…"/>
+            <p:cNvPr id="253" name="type Buyer interface {…"/>
             <p:cNvSpPr txBox="1"/>
             <p:nvPr/>
           </p:nvSpPr>
@@ -10035,7 +11459,7 @@
                                       <p:cBhvr>
                                         <p:cTn id="6" fill="hold"/>
                                         <p:tgtEl>
-                                          <p:spTgt spid="235"/>
+                                          <p:spTgt spid="244"/>
                                         </p:tgtEl>
                                         <p:attrNameLst>
                                           <p:attrName>style.visibility</p:attrName>
@@ -10049,7 +11473,7 @@
                                       <p:cBhvr>
                                         <p:cTn id="7" dur="500"/>
                                         <p:tgtEl>
-                                          <p:spTgt spid="235"/>
+                                          <p:spTgt spid="244"/>
                                         </p:tgtEl>
                                       </p:cBhvr>
                                     </p:animEffect>
@@ -10078,7 +11502,7 @@
                                       <p:cBhvr>
                                         <p:cTn id="10" fill="hold"/>
                                         <p:tgtEl>
-                                          <p:spTgt spid="238"/>
+                                          <p:spTgt spid="247"/>
                                         </p:tgtEl>
                                         <p:attrNameLst>
                                           <p:attrName>style.visibility</p:attrName>
@@ -10092,7 +11516,7 @@
                                       <p:cBhvr>
                                         <p:cTn id="11" dur="500"/>
                                         <p:tgtEl>
-                                          <p:spTgt spid="238"/>
+                                          <p:spTgt spid="247"/>
                                         </p:tgtEl>
                                       </p:cBhvr>
                                     </p:animEffect>
@@ -10121,7 +11545,7 @@
                                       <p:cBhvr>
                                         <p:cTn id="14" fill="hold"/>
                                         <p:tgtEl>
-                                          <p:spTgt spid="241"/>
+                                          <p:spTgt spid="250"/>
                                         </p:tgtEl>
                                         <p:attrNameLst>
                                           <p:attrName>style.visibility</p:attrName>
@@ -10135,7 +11559,7 @@
                                       <p:cBhvr>
                                         <p:cTn id="15" dur="500"/>
                                         <p:tgtEl>
-                                          <p:spTgt spid="241"/>
+                                          <p:spTgt spid="250"/>
                                         </p:tgtEl>
                                       </p:cBhvr>
                                     </p:animEffect>
@@ -10164,7 +11588,7 @@
                                       <p:cBhvr>
                                         <p:cTn id="18" fill="hold"/>
                                         <p:tgtEl>
-                                          <p:spTgt spid="242"/>
+                                          <p:spTgt spid="251"/>
                                         </p:tgtEl>
                                         <p:attrNameLst>
                                           <p:attrName>style.visibility</p:attrName>
@@ -10178,7 +11602,7 @@
                                       <p:cBhvr>
                                         <p:cTn id="19" dur="700"/>
                                         <p:tgtEl>
-                                          <p:spTgt spid="242"/>
+                                          <p:spTgt spid="251"/>
                                         </p:tgtEl>
                                       </p:cBhvr>
                                     </p:animEffect>
@@ -10207,7 +11631,7 @@
                                       <p:cBhvr>
                                         <p:cTn id="22" fill="hold"/>
                                         <p:tgtEl>
-                                          <p:spTgt spid="245"/>
+                                          <p:spTgt spid="254"/>
                                         </p:tgtEl>
                                         <p:attrNameLst>
                                           <p:attrName>style.visibility</p:attrName>
@@ -10221,7 +11645,7 @@
                                       <p:cBhvr>
                                         <p:cTn id="23" dur="700" fill="hold"/>
                                         <p:tgtEl>
-                                          <p:spTgt spid="245"/>
+                                          <p:spTgt spid="254"/>
                                         </p:tgtEl>
                                         <p:attrNameLst>
                                           <p:attrName>ppt_w</p:attrName>
@@ -10244,7 +11668,7 @@
                                       <p:cBhvr>
                                         <p:cTn id="24" dur="700" fill="hold"/>
                                         <p:tgtEl>
-                                          <p:spTgt spid="245"/>
+                                          <p:spTgt spid="254"/>
                                         </p:tgtEl>
                                         <p:attrNameLst>
                                           <p:attrName>ppt_h</p:attrName>
@@ -10294,17 +11718,17 @@
       </p:par>
     </p:tnLst>
     <p:bldLst>
-      <p:bldP build="whole" bldLvl="1" animBg="1" rev="0" advAuto="0" spid="242" grpId="4"/>
-      <p:bldP build="whole" bldLvl="1" animBg="1" rev="0" advAuto="0" spid="235" grpId="1"/>
-      <p:bldP build="whole" bldLvl="1" animBg="1" rev="0" advAuto="0" spid="241" grpId="3"/>
-      <p:bldP build="whole" bldLvl="1" animBg="1" rev="0" advAuto="0" spid="245" grpId="5"/>
-      <p:bldP build="whole" bldLvl="1" animBg="1" rev="0" advAuto="0" spid="238" grpId="2"/>
+      <p:bldP build="whole" bldLvl="1" animBg="1" rev="0" advAuto="0" spid="244" grpId="1"/>
+      <p:bldP build="whole" bldLvl="1" animBg="1" rev="0" advAuto="0" spid="251" grpId="4"/>
+      <p:bldP build="whole" bldLvl="1" animBg="1" rev="0" advAuto="0" spid="254" grpId="5"/>
+      <p:bldP build="whole" bldLvl="1" animBg="1" rev="0" advAuto="0" spid="250" grpId="3"/>
+      <p:bldP build="whole" bldLvl="1" animBg="1" rev="0" advAuto="0" spid="247" grpId="2"/>
     </p:bldLst>
   </p:timing>
 </p:sld>
 </file>
 
-<file path=ppt/slides/slide8.xml><?xml version="1.0" encoding="utf-8"?>
+<file path=ppt/slides/slide9.xml><?xml version="1.0" encoding="utf-8"?>
 <p:sld xmlns:a="http://schemas.openxmlformats.org/drawingml/2006/main" xmlns:r="http://schemas.openxmlformats.org/officeDocument/2006/relationships" xmlns:p="http://schemas.openxmlformats.org/presentationml/2006/main" xmlns:m="http://schemas.openxmlformats.org/officeDocument/2006/math" xmlns:a14="http://schemas.microsoft.com/office/drawing/2010/main" showMasterSp="1" showMasterPhAnim="1">
   <p:cSld>
     <p:bg>
@@ -10330,7 +11754,7 @@
       </p:grpSpPr>
       <p:sp>
         <p:nvSpPr>
-          <p:cNvPr id="247" name="Title 6"/>
+          <p:cNvPr id="256" name="Title 6"/>
           <p:cNvSpPr txBox="1"/>
           <p:nvPr>
             <p:ph type="title"/>
@@ -10366,7 +11790,7 @@
       </p:sp>
       <p:pic>
         <p:nvPicPr>
-          <p:cNvPr id="248" name="stopwatch (2).png" descr="stopwatch (2).png"/>
+          <p:cNvPr id="257" name="stopwatch (2).png" descr="stopwatch (2).png"/>
           <p:cNvPicPr>
             <a:picLocks noChangeAspect="1"/>
           </p:cNvPicPr>
@@ -10395,7 +11819,7 @@
       </p:pic>
       <p:grpSp>
         <p:nvGrpSpPr>
-          <p:cNvPr id="251" name="Group"/>
+          <p:cNvPr id="260" name="Group"/>
           <p:cNvGrpSpPr/>
           <p:nvPr/>
         </p:nvGrpSpPr>
@@ -10409,7 +11833,7 @@
         </p:grpSpPr>
         <p:sp>
           <p:nvSpPr>
-            <p:cNvPr id="249" name="Rounded Rectangle"/>
+            <p:cNvPr id="258" name="Rounded Rectangle"/>
             <p:cNvSpPr/>
             <p:nvPr/>
           </p:nvSpPr>
@@ -10466,7 +11890,7 @@
         </p:sp>
         <p:sp>
           <p:nvSpPr>
-            <p:cNvPr id="250" name="type HTTPClient interface {…"/>
+            <p:cNvPr id="259" name="type HTTPClient interface {…"/>
             <p:cNvSpPr txBox="1"/>
             <p:nvPr/>
           </p:nvSpPr>
@@ -10777,7 +12201,7 @@
       </p:grpSp>
       <p:grpSp>
         <p:nvGrpSpPr>
-          <p:cNvPr id="254" name="Group"/>
+          <p:cNvPr id="263" name="Group"/>
           <p:cNvGrpSpPr/>
           <p:nvPr/>
         </p:nvGrpSpPr>
@@ -10791,7 +12215,7 @@
         </p:grpSpPr>
         <p:sp>
           <p:nvSpPr>
-            <p:cNvPr id="252" name="Rounded Rectangle"/>
+            <p:cNvPr id="261" name="Rounded Rectangle"/>
             <p:cNvSpPr/>
             <p:nvPr/>
           </p:nvSpPr>
@@ -10848,7 +12272,7 @@
         </p:sp>
         <p:sp>
           <p:nvSpPr>
-            <p:cNvPr id="253" name="type HTMLParser interface {…"/>
+            <p:cNvPr id="262" name="type HTMLParser interface {…"/>
             <p:cNvSpPr txBox="1"/>
             <p:nvPr/>
           </p:nvSpPr>
@@ -11030,7 +12454,7 @@
       </p:grpSp>
       <p:grpSp>
         <p:nvGrpSpPr>
-          <p:cNvPr id="257" name="Group"/>
+          <p:cNvPr id="266" name="Group"/>
           <p:cNvGrpSpPr/>
           <p:nvPr/>
         </p:nvGrpSpPr>
@@ -11044,7 +12468,7 @@
         </p:grpSpPr>
         <p:sp>
           <p:nvSpPr>
-            <p:cNvPr id="255" name="Rounded Rectangle"/>
+            <p:cNvPr id="264" name="Rounded Rectangle"/>
             <p:cNvSpPr/>
             <p:nvPr/>
           </p:nvSpPr>
@@ -11101,7 +12525,7 @@
         </p:sp>
         <p:sp>
           <p:nvSpPr>
-            <p:cNvPr id="256" name="type Browser interface {…"/>
+            <p:cNvPr id="265" name="type Browser interface {…"/>
             <p:cNvSpPr txBox="1"/>
             <p:nvPr/>
           </p:nvSpPr>
@@ -11283,7 +12707,7 @@
       </p:grpSp>
       <p:pic>
         <p:nvPicPr>
-          <p:cNvPr id="258" name="internet-explorer-icon-png-6.png" descr="internet-explorer-icon-png-6.png"/>
+          <p:cNvPr id="267" name="internet-explorer-icon-png-6.png" descr="internet-explorer-icon-png-6.png"/>
           <p:cNvPicPr>
             <a:picLocks noChangeAspect="1"/>
           </p:cNvPicPr>
@@ -11312,7 +12736,7 @@
       </p:pic>
       <p:pic>
         <p:nvPicPr>
-          <p:cNvPr id="259" name="Firefox_Logo,_2017.png" descr="Firefox_Logo,_2017.png"/>
+          <p:cNvPr id="268" name="Firefox_Logo,_2017.png" descr="Firefox_Logo,_2017.png"/>
           <p:cNvPicPr>
             <a:picLocks noChangeAspect="1"/>
           </p:cNvPicPr>
@@ -11341,7 +12765,7 @@
       </p:pic>
       <p:pic>
         <p:nvPicPr>
-          <p:cNvPr id="260" name="Google_Chrome_icon_(2011).png" descr="Google_Chrome_icon_(2011).png"/>
+          <p:cNvPr id="269" name="Google_Chrome_icon_(2011).png" descr="Google_Chrome_icon_(2011).png"/>
           <p:cNvPicPr>
             <a:picLocks noChangeAspect="1"/>
           </p:cNvPicPr>
@@ -11370,7 +12794,7 @@
       </p:pic>
       <p:pic>
         <p:nvPicPr>
-          <p:cNvPr id="261" name="5b3b46b69357a48ff2188195.png" descr="5b3b46b69357a48ff2188195.png"/>
+          <p:cNvPr id="270" name="5b3b46b69357a48ff2188195.png" descr="5b3b46b69357a48ff2188195.png"/>
           <p:cNvPicPr>
             <a:picLocks noChangeAspect="1"/>
           </p:cNvPicPr>
@@ -11450,7 +12874,7 @@
                                       <p:cBhvr>
                                         <p:cTn id="6" fill="hold"/>
                                         <p:tgtEl>
-                                          <p:spTgt spid="251"/>
+                                          <p:spTgt spid="266"/>
                                         </p:tgtEl>
                                         <p:attrNameLst>
                                           <p:attrName>style.visibility</p:attrName>
@@ -11464,7 +12888,7 @@
                                       <p:cBhvr>
                                         <p:cTn id="7" dur="700" fill="hold"/>
                                         <p:tgtEl>
-                                          <p:spTgt spid="251"/>
+                                          <p:spTgt spid="266"/>
                                         </p:tgtEl>
                                         <p:attrNameLst>
                                           <p:attrName>ppt_w</p:attrName>
@@ -11487,7 +12911,7 @@
                                       <p:cBhvr>
                                         <p:cTn id="8" dur="700" fill="hold"/>
                                         <p:tgtEl>
-                                          <p:spTgt spid="251"/>
+                                          <p:spTgt spid="266"/>
                                         </p:tgtEl>
                                         <p:attrNameLst>
                                           <p:attrName>ppt_h</p:attrName>
@@ -11519,7 +12943,7 @@
                             </p:stCondLst>
                             <p:childTnLst>
                               <p:par>
-                                <p:cTn id="10" presetClass="entr" nodeType="afterEffect" presetSubtype="10" presetID="19" grpId="3" fill="hold">
+                                <p:cTn id="10" presetClass="entr" nodeType="afterEffect" presetSubtype="10" presetID="19" grpId="2" fill="hold">
                                   <p:stCondLst>
                                     <p:cond delay="0"/>
                                   </p:stCondLst>
@@ -11531,7 +12955,7 @@
                                       <p:cBhvr>
                                         <p:cTn id="11" fill="hold"/>
                                         <p:tgtEl>
-                                          <p:spTgt spid="254"/>
+                                          <p:spTgt spid="263"/>
                                         </p:tgtEl>
                                         <p:attrNameLst>
                                           <p:attrName>style.visibility</p:attrName>
@@ -11545,7 +12969,7 @@
                                       <p:cBhvr>
                                         <p:cTn id="12" dur="700" fill="hold"/>
                                         <p:tgtEl>
-                                          <p:spTgt spid="254"/>
+                                          <p:spTgt spid="263"/>
                                         </p:tgtEl>
                                         <p:attrNameLst>
                                           <p:attrName>ppt_w</p:attrName>
@@ -11568,7 +12992,7 @@
                                       <p:cBhvr>
                                         <p:cTn id="13" dur="700" fill="hold"/>
                                         <p:tgtEl>
-                                          <p:spTgt spid="254"/>
+                                          <p:spTgt spid="263"/>
                                         </p:tgtEl>
                                         <p:attrNameLst>
                                           <p:attrName>ppt_h</p:attrName>
@@ -11600,7 +13024,7 @@
                             </p:stCondLst>
                             <p:childTnLst>
                               <p:par>
-                                <p:cTn id="15" presetClass="entr" nodeType="afterEffect" presetSubtype="10" presetID="19" grpId="5" fill="hold">
+                                <p:cTn id="15" presetClass="entr" nodeType="afterEffect" presetSubtype="10" presetID="19" grpId="3" fill="hold">
                                   <p:stCondLst>
                                     <p:cond delay="0"/>
                                   </p:stCondLst>
@@ -11612,7 +13036,7 @@
                                       <p:cBhvr>
                                         <p:cTn id="16" fill="hold"/>
                                         <p:tgtEl>
-                                          <p:spTgt spid="257"/>
+                                          <p:spTgt spid="260"/>
                                         </p:tgtEl>
                                         <p:attrNameLst>
                                           <p:attrName>style.visibility</p:attrName>
@@ -11626,7 +13050,7 @@
                                       <p:cBhvr>
                                         <p:cTn id="17" dur="700" fill="hold"/>
                                         <p:tgtEl>
-                                          <p:spTgt spid="257"/>
+                                          <p:spTgt spid="260"/>
                                         </p:tgtEl>
                                         <p:attrNameLst>
                                           <p:attrName>ppt_w</p:attrName>
@@ -11649,7 +13073,7 @@
                                       <p:cBhvr>
                                         <p:cTn id="18" dur="700" fill="hold"/>
                                         <p:tgtEl>
-                                          <p:spTgt spid="257"/>
+                                          <p:spTgt spid="260"/>
                                         </p:tgtEl>
                                         <p:attrNameLst>
                                           <p:attrName>ppt_h</p:attrName>
@@ -11668,6 +13092,187 @@
                                         </p:tav>
                                       </p:tavLst>
                                     </p:anim>
+                                  </p:childTnLst>
+                                </p:cTn>
+                              </p:par>
+                            </p:childTnLst>
+                          </p:cTn>
+                        </p:par>
+                      </p:childTnLst>
+                    </p:cTn>
+                  </p:par>
+                  <p:par>
+                    <p:cTn id="19" fill="hold">
+                      <p:stCondLst>
+                        <p:cond delay="indefinite"/>
+                      </p:stCondLst>
+                      <p:childTnLst>
+                        <p:par>
+                          <p:cTn id="20" fill="hold">
+                            <p:stCondLst>
+                              <p:cond delay="0"/>
+                            </p:stCondLst>
+                            <p:childTnLst>
+                              <p:par>
+                                <p:cTn id="21" presetClass="entr" nodeType="clickEffect" presetSubtype="32" presetID="4" grpId="4" fill="hold">
+                                  <p:stCondLst>
+                                    <p:cond delay="0"/>
+                                  </p:stCondLst>
+                                  <p:iterate type="el" backwards="0">
+                                    <p:tmAbs val="0"/>
+                                  </p:iterate>
+                                  <p:childTnLst>
+                                    <p:set>
+                                      <p:cBhvr>
+                                        <p:cTn id="22" fill="hold"/>
+                                        <p:tgtEl>
+                                          <p:spTgt spid="269"/>
+                                        </p:tgtEl>
+                                        <p:attrNameLst>
+                                          <p:attrName>style.visibility</p:attrName>
+                                        </p:attrNameLst>
+                                      </p:cBhvr>
+                                      <p:to>
+                                        <p:strVal val="visible"/>
+                                      </p:to>
+                                    </p:set>
+                                    <p:animEffect filter="box(out)" transition="in">
+                                      <p:cBhvr>
+                                        <p:cTn id="23" dur="500"/>
+                                        <p:tgtEl>
+                                          <p:spTgt spid="269"/>
+                                        </p:tgtEl>
+                                      </p:cBhvr>
+                                    </p:animEffect>
+                                  </p:childTnLst>
+                                </p:cTn>
+                              </p:par>
+                            </p:childTnLst>
+                          </p:cTn>
+                        </p:par>
+                        <p:par>
+                          <p:cTn id="24" fill="hold">
+                            <p:stCondLst>
+                              <p:cond delay="500"/>
+                            </p:stCondLst>
+                            <p:childTnLst>
+                              <p:par>
+                                <p:cTn id="25" presetClass="entr" nodeType="afterEffect" presetSubtype="32" presetID="4" grpId="5" fill="hold">
+                                  <p:stCondLst>
+                                    <p:cond delay="100"/>
+                                  </p:stCondLst>
+                                  <p:iterate type="el" backwards="0">
+                                    <p:tmAbs val="0"/>
+                                  </p:iterate>
+                                  <p:childTnLst>
+                                    <p:set>
+                                      <p:cBhvr>
+                                        <p:cTn id="26" fill="hold"/>
+                                        <p:tgtEl>
+                                          <p:spTgt spid="268"/>
+                                        </p:tgtEl>
+                                        <p:attrNameLst>
+                                          <p:attrName>style.visibility</p:attrName>
+                                        </p:attrNameLst>
+                                      </p:cBhvr>
+                                      <p:to>
+                                        <p:strVal val="visible"/>
+                                      </p:to>
+                                    </p:set>
+                                    <p:animEffect filter="box(out)" transition="in">
+                                      <p:cBhvr>
+                                        <p:cTn id="27" dur="500"/>
+                                        <p:tgtEl>
+                                          <p:spTgt spid="268"/>
+                                        </p:tgtEl>
+                                      </p:cBhvr>
+                                    </p:animEffect>
+                                  </p:childTnLst>
+                                </p:cTn>
+                              </p:par>
+                            </p:childTnLst>
+                          </p:cTn>
+                        </p:par>
+                        <p:par>
+                          <p:cTn id="28" fill="hold">
+                            <p:stCondLst>
+                              <p:cond delay="1100"/>
+                            </p:stCondLst>
+                            <p:childTnLst>
+                              <p:par>
+                                <p:cTn id="29" presetClass="entr" nodeType="afterEffect" presetSubtype="32" presetID="4" grpId="6" fill="hold">
+                                  <p:stCondLst>
+                                    <p:cond delay="100"/>
+                                  </p:stCondLst>
+                                  <p:iterate type="el" backwards="0">
+                                    <p:tmAbs val="0"/>
+                                  </p:iterate>
+                                  <p:childTnLst>
+                                    <p:set>
+                                      <p:cBhvr>
+                                        <p:cTn id="30" fill="hold"/>
+                                        <p:tgtEl>
+                                          <p:spTgt spid="270"/>
+                                        </p:tgtEl>
+                                        <p:attrNameLst>
+                                          <p:attrName>style.visibility</p:attrName>
+                                        </p:attrNameLst>
+                                      </p:cBhvr>
+                                      <p:to>
+                                        <p:strVal val="visible"/>
+                                      </p:to>
+                                    </p:set>
+                                    <p:animEffect filter="box(out)" transition="in">
+                                      <p:cBhvr>
+                                        <p:cTn id="31" dur="500"/>
+                                        <p:tgtEl>
+                                          <p:spTgt spid="270"/>
+                                        </p:tgtEl>
+                                      </p:cBhvr>
+                                    </p:animEffect>
+                                  </p:childTnLst>
+                                </p:cTn>
+                              </p:par>
+                            </p:childTnLst>
+                          </p:cTn>
+                        </p:par>
+                        <p:par>
+                          <p:cTn id="32" fill="hold">
+                            <p:stCondLst>
+                              <p:cond delay="1700"/>
+                            </p:stCondLst>
+                            <p:childTnLst>
+                              <p:par>
+                                <p:cTn id="33" presetClass="entr" nodeType="afterEffect" presetSubtype="32" presetID="4" grpId="7" fill="hold">
+                                  <p:stCondLst>
+                                    <p:cond delay="100"/>
+                                  </p:stCondLst>
+                                  <p:iterate type="el" backwards="0">
+                                    <p:tmAbs val="0"/>
+                                  </p:iterate>
+                                  <p:childTnLst>
+                                    <p:set>
+                                      <p:cBhvr>
+                                        <p:cTn id="34" fill="hold"/>
+                                        <p:tgtEl>
+                                          <p:spTgt spid="267"/>
+                                        </p:tgtEl>
+                                        <p:attrNameLst>
+                                          <p:attrName>style.visibility</p:attrName>
+                                        </p:attrNameLst>
+                                      </p:cBhvr>
+                                      <p:to>
+                                        <p:strVal val="visible"/>
+                                      </p:to>
+                                    </p:set>
+                                    <p:animEffect filter="box(out)" transition="in">
+                                      <p:cBhvr>
+                                        <p:cTn id="35" dur="500"/>
+                                        <p:tgtEl>
+                                          <p:spTgt spid="267"/>
+                                        </p:tgtEl>
+                                      </p:cBhvr>
+                                    </p:animEffect>
                                   </p:childTnLst>
                                 </p:cTn>
                               </p:par>
@@ -11699,9 +13304,13 @@
       </p:par>
     </p:tnLst>
     <p:bldLst>
-      <p:bldP build="whole" bldLvl="1" animBg="1" rev="0" advAuto="0" spid="251" grpId="1"/>
-      <p:bldP build="whole" bldLvl="1" animBg="1" rev="0" advAuto="0" spid="257" grpId="5"/>
-      <p:bldP build="whole" bldLvl="1" animBg="1" rev="0" advAuto="0" spid="254" grpId="3"/>
+      <p:bldP build="whole" bldLvl="1" animBg="1" rev="0" advAuto="0" spid="263" grpId="2"/>
+      <p:bldP build="whole" bldLvl="1" animBg="1" rev="0" advAuto="0" spid="270" grpId="6"/>
+      <p:bldP build="whole" bldLvl="1" animBg="1" rev="0" advAuto="0" spid="268" grpId="5"/>
+      <p:bldP build="whole" bldLvl="1" animBg="1" rev="0" advAuto="0" spid="266" grpId="1"/>
+      <p:bldP build="whole" bldLvl="1" animBg="1" rev="0" advAuto="0" spid="267" grpId="7"/>
+      <p:bldP build="whole" bldLvl="1" animBg="1" rev="0" advAuto="0" spid="260" grpId="3"/>
+      <p:bldP build="whole" bldLvl="1" animBg="1" rev="0" advAuto="0" spid="269" grpId="4"/>
     </p:bldLst>
   </p:timing>
 </p:sld>

</xml_diff>